<commit_message>
working on Module 3
</commit_message>
<xml_diff>
--- a/Slides/Lesson 3.3 Draggable-Cat.pptx
+++ b/Slides/Lesson 3.3 Draggable-Cat.pptx
@@ -238,7 +238,7 @@
             <a:fld id="{CF8F25F6-E1EF-4065-8525-42EDEBD9BD22}" type="datetimeFigureOut">
               <a:rPr lang="en-US" smtClean="0"/>
               <a:pPr/>
-              <a:t>8/20/2015</a:t>
+              <a:t>8/1/2016</a:t>
             </a:fld>
             <a:endParaRPr lang="en-US"/>
           </a:p>
@@ -304,38 +304,37 @@
           <a:p>
             <a:pPr lvl="0"/>
             <a:r>
-              <a:rPr lang="en-US" smtClean="0"/>
+              <a:rPr lang="en-US"/>
               <a:t>Click to edit Master text styles</a:t>
             </a:r>
           </a:p>
           <a:p>
             <a:pPr lvl="1"/>
             <a:r>
-              <a:rPr lang="en-US" smtClean="0"/>
+              <a:rPr lang="en-US"/>
               <a:t>Second level</a:t>
             </a:r>
           </a:p>
           <a:p>
             <a:pPr lvl="2"/>
             <a:r>
-              <a:rPr lang="en-US" smtClean="0"/>
+              <a:rPr lang="en-US"/>
               <a:t>Third level</a:t>
             </a:r>
           </a:p>
           <a:p>
             <a:pPr lvl="3"/>
             <a:r>
-              <a:rPr lang="en-US" smtClean="0"/>
+              <a:rPr lang="en-US"/>
               <a:t>Fourth level</a:t>
             </a:r>
           </a:p>
           <a:p>
             <a:pPr lvl="4"/>
             <a:r>
-              <a:rPr lang="en-US" smtClean="0"/>
+              <a:rPr lang="en-US"/>
               <a:t>Fifth level</a:t>
             </a:r>
-            <a:endParaRPr lang="en-US"/>
           </a:p>
         </p:txBody>
       </p:sp>
@@ -556,29 +555,29 @@
           <a:lstStyle/>
           <a:p>
             <a:r>
-              <a:rPr lang="en-US" dirty="0" smtClean="0"/>
+              <a:rPr lang="en-US" dirty="0"/>
               <a:t>Welcome to Week 2, Lesson 1: "How to Design Universe Programs".</a:t>
             </a:r>
           </a:p>
           <a:p>
-            <a:endParaRPr lang="en-US" dirty="0" smtClean="0"/>
-          </a:p>
-          <a:p>
-            <a:r>
-              <a:rPr lang="en-US" dirty="0" smtClean="0"/>
+            <a:endParaRPr lang="en-US" dirty="0"/>
+          </a:p>
+          <a:p>
+            <a:r>
+              <a:rPr lang="en-US" dirty="0"/>
               <a:t>In this lesson, you will learn the</a:t>
             </a:r>
             <a:r>
-              <a:rPr lang="en-US" baseline="0" dirty="0" smtClean="0"/>
+              <a:rPr lang="en-US" baseline="0" dirty="0"/>
               <a:t> steps in designing universe programs.  You will learn how to decide what data goes into the state of a world, and what does not.</a:t>
             </a:r>
           </a:p>
           <a:p>
-            <a:endParaRPr lang="en-US" baseline="0" dirty="0" smtClean="0"/>
-          </a:p>
-          <a:p>
-            <a:r>
-              <a:rPr lang="en-US" baseline="0" dirty="0" smtClean="0"/>
+            <a:endParaRPr lang="en-US" baseline="0" dirty="0"/>
+          </a:p>
+          <a:p>
+            <a:r>
+              <a:rPr lang="en-US" baseline="0" dirty="0"/>
               <a:t>We will also introduce the concept of a "wish list" to help you organize your program.</a:t>
             </a:r>
             <a:endParaRPr lang="en-US" dirty="0"/>
@@ -745,10 +744,9 @@
           <a:lstStyle/>
           <a:p>
             <a:r>
-              <a:rPr lang="en-US" smtClean="0"/>
+              <a:rPr lang="en-US"/>
               <a:t>Click to edit Master title style</a:t>
             </a:r>
-            <a:endParaRPr lang="en-US"/>
           </a:p>
         </p:txBody>
       </p:sp>
@@ -864,10 +862,9 @@
           </a:lstStyle>
           <a:p>
             <a:r>
-              <a:rPr lang="en-US" smtClean="0"/>
+              <a:rPr lang="en-US"/>
               <a:t>Click to edit Master subtitle style</a:t>
             </a:r>
-            <a:endParaRPr lang="en-US"/>
           </a:p>
         </p:txBody>
       </p:sp>
@@ -888,7 +885,7 @@
           <a:p>
             <a:fld id="{5BD94FF1-2CFB-4EFF-9C47-F7A96480AD97}" type="datetime1">
               <a:rPr lang="en-US" smtClean="0"/>
-              <a:t>8/20/2015</a:t>
+              <a:t>8/1/2016</a:t>
             </a:fld>
             <a:endParaRPr lang="en-US"/>
           </a:p>
@@ -946,13 +943,6 @@
   <p:clrMapOvr>
     <a:masterClrMapping/>
   </p:clrMapOvr>
-  <p:timing>
-    <p:tnLst>
-      <p:par>
-        <p:cTn id="1" dur="indefinite" restart="never" nodeType="tmRoot"/>
-      </p:par>
-    </p:tnLst>
-  </p:timing>
 </p:sldLayout>
 </file>
 
@@ -990,7 +980,7 @@
           <a:p>
             <a:fld id="{4EF29BE0-8F73-4845-8D35-47D13C535AF2}" type="datetime1">
               <a:rPr lang="en-US" smtClean="0"/>
-              <a:t>8/20/2015</a:t>
+              <a:t>8/1/2016</a:t>
             </a:fld>
             <a:endParaRPr lang="en-US"/>
           </a:p>
@@ -1093,10 +1083,9 @@
           </a:lstStyle>
           <a:p>
             <a:r>
-              <a:rPr lang="en-US" smtClean="0"/>
+              <a:rPr lang="en-US"/>
               <a:t>Click to edit Master title style</a:t>
             </a:r>
-            <a:endParaRPr lang="en-US"/>
           </a:p>
         </p:txBody>
       </p:sp>
@@ -1150,38 +1139,37 @@
           <a:p>
             <a:pPr lvl="0"/>
             <a:r>
-              <a:rPr lang="en-US" smtClean="0"/>
+              <a:rPr lang="en-US"/>
               <a:t>Click to edit Master text styles</a:t>
             </a:r>
           </a:p>
           <a:p>
             <a:pPr lvl="1"/>
             <a:r>
-              <a:rPr lang="en-US" smtClean="0"/>
+              <a:rPr lang="en-US"/>
               <a:t>Second level</a:t>
             </a:r>
           </a:p>
           <a:p>
             <a:pPr lvl="2"/>
             <a:r>
-              <a:rPr lang="en-US" smtClean="0"/>
+              <a:rPr lang="en-US"/>
               <a:t>Third level</a:t>
             </a:r>
           </a:p>
           <a:p>
             <a:pPr lvl="3"/>
             <a:r>
-              <a:rPr lang="en-US" smtClean="0"/>
+              <a:rPr lang="en-US"/>
               <a:t>Fourth level</a:t>
             </a:r>
           </a:p>
           <a:p>
             <a:pPr lvl="4"/>
             <a:r>
-              <a:rPr lang="en-US" smtClean="0"/>
+              <a:rPr lang="en-US"/>
               <a:t>Fifth level</a:t>
             </a:r>
-            <a:endParaRPr lang="en-US"/>
           </a:p>
         </p:txBody>
       </p:sp>
@@ -1244,7 +1232,7 @@
           <a:p>
             <a:pPr lvl="0"/>
             <a:r>
-              <a:rPr lang="en-US" smtClean="0"/>
+              <a:rPr lang="en-US"/>
               <a:t>Click to edit Master text styles</a:t>
             </a:r>
           </a:p>
@@ -1267,7 +1255,7 @@
           <a:p>
             <a:fld id="{FB8D566C-E766-4BBF-AE5F-BC13B5DFB36F}" type="datetime1">
               <a:rPr lang="en-US" smtClean="0"/>
-              <a:t>8/20/2015</a:t>
+              <a:t>8/1/2016</a:t>
             </a:fld>
             <a:endParaRPr lang="en-US"/>
           </a:p>
@@ -1370,10 +1358,9 @@
           </a:lstStyle>
           <a:p>
             <a:r>
-              <a:rPr lang="en-US" smtClean="0"/>
+              <a:rPr lang="en-US"/>
               <a:t>Click to edit Master title style</a:t>
             </a:r>
-            <a:endParaRPr lang="en-US"/>
           </a:p>
         </p:txBody>
       </p:sp>
@@ -1497,7 +1484,7 @@
           <a:p>
             <a:pPr lvl="0"/>
             <a:r>
-              <a:rPr lang="en-US" smtClean="0"/>
+              <a:rPr lang="en-US"/>
               <a:t>Click to edit Master text styles</a:t>
             </a:r>
           </a:p>
@@ -1520,7 +1507,7 @@
           <a:p>
             <a:fld id="{5E78A02A-854C-44E8-A453-9D2196E13A65}" type="datetime1">
               <a:rPr lang="en-US" smtClean="0"/>
-              <a:t>8/20/2015</a:t>
+              <a:t>8/1/2016</a:t>
             </a:fld>
             <a:endParaRPr lang="en-US"/>
           </a:p>
@@ -1614,10 +1601,9 @@
           <a:lstStyle/>
           <a:p>
             <a:r>
-              <a:rPr lang="en-US" smtClean="0"/>
+              <a:rPr lang="en-US"/>
               <a:t>Click to edit Master title style</a:t>
             </a:r>
-            <a:endParaRPr lang="en-US"/>
           </a:p>
         </p:txBody>
       </p:sp>
@@ -1638,38 +1624,37 @@
           <a:p>
             <a:pPr lvl="0"/>
             <a:r>
-              <a:rPr lang="en-US" smtClean="0"/>
+              <a:rPr lang="en-US"/>
               <a:t>Click to edit Master text styles</a:t>
             </a:r>
           </a:p>
           <a:p>
             <a:pPr lvl="1"/>
             <a:r>
-              <a:rPr lang="en-US" smtClean="0"/>
+              <a:rPr lang="en-US"/>
               <a:t>Second level</a:t>
             </a:r>
           </a:p>
           <a:p>
             <a:pPr lvl="2"/>
             <a:r>
-              <a:rPr lang="en-US" smtClean="0"/>
+              <a:rPr lang="en-US"/>
               <a:t>Third level</a:t>
             </a:r>
           </a:p>
           <a:p>
             <a:pPr lvl="3"/>
             <a:r>
-              <a:rPr lang="en-US" smtClean="0"/>
+              <a:rPr lang="en-US"/>
               <a:t>Fourth level</a:t>
             </a:r>
           </a:p>
           <a:p>
             <a:pPr lvl="4"/>
             <a:r>
-              <a:rPr lang="en-US" smtClean="0"/>
+              <a:rPr lang="en-US"/>
               <a:t>Fifth level</a:t>
             </a:r>
-            <a:endParaRPr lang="en-US"/>
           </a:p>
         </p:txBody>
       </p:sp>
@@ -1690,7 +1675,7 @@
           <a:p>
             <a:fld id="{41CAA29A-CA0B-4551-9D4E-C1EA7EFEB3C9}" type="datetime1">
               <a:rPr lang="en-US" smtClean="0"/>
-              <a:t>8/20/2015</a:t>
+              <a:t>8/1/2016</a:t>
             </a:fld>
             <a:endParaRPr lang="en-US"/>
           </a:p>
@@ -1789,10 +1774,9 @@
           <a:lstStyle/>
           <a:p>
             <a:r>
-              <a:rPr lang="en-US" smtClean="0"/>
+              <a:rPr lang="en-US"/>
               <a:t>Click to edit Master title style</a:t>
             </a:r>
-            <a:endParaRPr lang="en-US"/>
           </a:p>
         </p:txBody>
       </p:sp>
@@ -1818,38 +1802,37 @@
           <a:p>
             <a:pPr lvl="0"/>
             <a:r>
-              <a:rPr lang="en-US" smtClean="0"/>
+              <a:rPr lang="en-US"/>
               <a:t>Click to edit Master text styles</a:t>
             </a:r>
           </a:p>
           <a:p>
             <a:pPr lvl="1"/>
             <a:r>
-              <a:rPr lang="en-US" smtClean="0"/>
+              <a:rPr lang="en-US"/>
               <a:t>Second level</a:t>
             </a:r>
           </a:p>
           <a:p>
             <a:pPr lvl="2"/>
             <a:r>
-              <a:rPr lang="en-US" smtClean="0"/>
+              <a:rPr lang="en-US"/>
               <a:t>Third level</a:t>
             </a:r>
           </a:p>
           <a:p>
             <a:pPr lvl="3"/>
             <a:r>
-              <a:rPr lang="en-US" smtClean="0"/>
+              <a:rPr lang="en-US"/>
               <a:t>Fourth level</a:t>
             </a:r>
           </a:p>
           <a:p>
             <a:pPr lvl="4"/>
             <a:r>
-              <a:rPr lang="en-US" smtClean="0"/>
+              <a:rPr lang="en-US"/>
               <a:t>Fifth level</a:t>
             </a:r>
-            <a:endParaRPr lang="en-US"/>
           </a:p>
         </p:txBody>
       </p:sp>
@@ -1870,7 +1853,7 @@
           <a:p>
             <a:fld id="{D1C4437C-E561-49F0-A4E0-D3218DEB90B8}" type="datetime1">
               <a:rPr lang="en-US" smtClean="0"/>
-              <a:t>8/20/2015</a:t>
+              <a:t>8/1/2016</a:t>
             </a:fld>
             <a:endParaRPr lang="en-US"/>
           </a:p>
@@ -1970,10 +1953,9 @@
           <a:lstStyle/>
           <a:p>
             <a:r>
-              <a:rPr lang="en-US" dirty="0" smtClean="0"/>
+              <a:rPr lang="en-US" dirty="0"/>
               <a:t>Click to edit Master title style</a:t>
             </a:r>
-            <a:endParaRPr lang="en-US" dirty="0"/>
           </a:p>
         </p:txBody>
       </p:sp>
@@ -1994,38 +1976,37 @@
           <a:p>
             <a:pPr lvl="0"/>
             <a:r>
-              <a:rPr lang="en-US" smtClean="0"/>
+              <a:rPr lang="en-US"/>
               <a:t>Click to edit Master text styles</a:t>
             </a:r>
           </a:p>
           <a:p>
             <a:pPr lvl="1"/>
             <a:r>
-              <a:rPr lang="en-US" smtClean="0"/>
+              <a:rPr lang="en-US"/>
               <a:t>Second level</a:t>
             </a:r>
           </a:p>
           <a:p>
             <a:pPr lvl="2"/>
             <a:r>
-              <a:rPr lang="en-US" smtClean="0"/>
+              <a:rPr lang="en-US"/>
               <a:t>Third level</a:t>
             </a:r>
           </a:p>
           <a:p>
             <a:pPr lvl="3"/>
             <a:r>
-              <a:rPr lang="en-US" smtClean="0"/>
+              <a:rPr lang="en-US"/>
               <a:t>Fourth level</a:t>
             </a:r>
           </a:p>
           <a:p>
             <a:pPr lvl="4"/>
             <a:r>
-              <a:rPr lang="en-US" smtClean="0"/>
+              <a:rPr lang="en-US"/>
               <a:t>Fifth level</a:t>
             </a:r>
-            <a:endParaRPr lang="en-US"/>
           </a:p>
         </p:txBody>
       </p:sp>
@@ -2046,7 +2027,7 @@
           <a:p>
             <a:fld id="{EFB02A12-8D17-4309-9DBC-DE80FBF17AA8}" type="datetime1">
               <a:rPr lang="en-US" smtClean="0"/>
-              <a:t>8/20/2015</a:t>
+              <a:t>8/1/2016</a:t>
             </a:fld>
             <a:endParaRPr lang="en-US"/>
           </a:p>
@@ -2104,13 +2085,6 @@
   <p:clrMapOvr>
     <a:masterClrMapping/>
   </p:clrMapOvr>
-  <p:timing>
-    <p:tnLst>
-      <p:par>
-        <p:cTn id="1" dur="indefinite" restart="never" nodeType="tmRoot"/>
-      </p:par>
-    </p:tnLst>
-  </p:timing>
 </p:sldLayout>
 </file>
 
@@ -2147,10 +2121,9 @@
           <a:lstStyle/>
           <a:p>
             <a:r>
-              <a:rPr lang="en-US" smtClean="0"/>
+              <a:rPr lang="en-US"/>
               <a:t>Click to edit Master title style</a:t>
             </a:r>
-            <a:endParaRPr lang="en-US"/>
           </a:p>
         </p:txBody>
       </p:sp>
@@ -2176,38 +2149,37 @@
           <a:p>
             <a:pPr lvl="0"/>
             <a:r>
-              <a:rPr lang="en-US" dirty="0" smtClean="0"/>
+              <a:rPr lang="en-US" dirty="0"/>
               <a:t>Click to edit Master text styles</a:t>
             </a:r>
           </a:p>
           <a:p>
             <a:pPr lvl="1"/>
             <a:r>
-              <a:rPr lang="en-US" dirty="0" smtClean="0"/>
+              <a:rPr lang="en-US" dirty="0"/>
               <a:t>Second level</a:t>
             </a:r>
           </a:p>
           <a:p>
             <a:pPr lvl="2"/>
             <a:r>
-              <a:rPr lang="en-US" dirty="0" smtClean="0"/>
+              <a:rPr lang="en-US" dirty="0"/>
               <a:t>Third level</a:t>
             </a:r>
           </a:p>
           <a:p>
             <a:pPr lvl="3"/>
             <a:r>
-              <a:rPr lang="en-US" dirty="0" smtClean="0"/>
+              <a:rPr lang="en-US" dirty="0"/>
               <a:t>Fourth level</a:t>
             </a:r>
           </a:p>
           <a:p>
             <a:pPr lvl="4"/>
             <a:r>
-              <a:rPr lang="en-US" dirty="0" smtClean="0"/>
+              <a:rPr lang="en-US" dirty="0"/>
               <a:t>Fifth level</a:t>
             </a:r>
-            <a:endParaRPr lang="en-US" dirty="0"/>
           </a:p>
         </p:txBody>
       </p:sp>
@@ -2228,7 +2200,7 @@
           <a:p>
             <a:fld id="{405635ED-0D1E-40EB-B672-319B51AF082D}" type="datetime1">
               <a:rPr lang="en-US" smtClean="0"/>
-              <a:t>8/20/2015</a:t>
+              <a:t>8/1/2016</a:t>
             </a:fld>
             <a:endParaRPr lang="en-US"/>
           </a:p>
@@ -2318,7 +2290,7 @@
           <a:lstStyle/>
           <a:p>
             <a:pPr algn="ctr"/>
-            <a:endParaRPr lang="en-US" dirty="0" smtClean="0">
+            <a:endParaRPr lang="en-US" dirty="0">
               <a:solidFill>
                 <a:schemeClr val="tx1"/>
               </a:solidFill>
@@ -2349,11 +2321,11 @@
           <a:lstStyle/>
           <a:p>
             <a:r>
-              <a:rPr lang="en-US" dirty="0" smtClean="0"/>
+              <a:rPr lang="en-US" dirty="0"/>
               <a:t>Resize video to this</a:t>
             </a:r>
             <a:r>
-              <a:rPr lang="en-US" baseline="0" dirty="0" smtClean="0"/>
+              <a:rPr lang="en-US" baseline="0" dirty="0"/>
               <a:t> box.</a:t>
             </a:r>
             <a:endParaRPr lang="en-US" dirty="0"/>
@@ -2370,13 +2342,6 @@
   <p:clrMapOvr>
     <a:masterClrMapping/>
   </p:clrMapOvr>
-  <p:timing>
-    <p:tnLst>
-      <p:par>
-        <p:cTn id="1" dur="indefinite" restart="never" nodeType="tmRoot"/>
-      </p:par>
-    </p:tnLst>
-  </p:timing>
 </p:sldLayout>
 </file>
 
@@ -2413,10 +2378,9 @@
           <a:lstStyle/>
           <a:p>
             <a:r>
-              <a:rPr lang="en-US" smtClean="0"/>
+              <a:rPr lang="en-US"/>
               <a:t>Click to edit Master title style</a:t>
             </a:r>
-            <a:endParaRPr lang="en-US"/>
           </a:p>
         </p:txBody>
       </p:sp>
@@ -2445,38 +2409,37 @@
           <a:p>
             <a:pPr lvl="0"/>
             <a:r>
-              <a:rPr lang="en-US" dirty="0" smtClean="0"/>
+              <a:rPr lang="en-US" dirty="0"/>
               <a:t>Click to edit Master text styles</a:t>
             </a:r>
           </a:p>
           <a:p>
             <a:pPr lvl="1"/>
             <a:r>
-              <a:rPr lang="en-US" dirty="0" smtClean="0"/>
+              <a:rPr lang="en-US" dirty="0"/>
               <a:t>Second level</a:t>
             </a:r>
           </a:p>
           <a:p>
             <a:pPr lvl="2"/>
             <a:r>
-              <a:rPr lang="en-US" dirty="0" smtClean="0"/>
+              <a:rPr lang="en-US" dirty="0"/>
               <a:t>Third level</a:t>
             </a:r>
           </a:p>
           <a:p>
             <a:pPr lvl="3"/>
             <a:r>
-              <a:rPr lang="en-US" dirty="0" smtClean="0"/>
+              <a:rPr lang="en-US" dirty="0"/>
               <a:t>Fourth level</a:t>
             </a:r>
           </a:p>
           <a:p>
             <a:pPr lvl="4"/>
             <a:r>
-              <a:rPr lang="en-US" dirty="0" smtClean="0"/>
+              <a:rPr lang="en-US" dirty="0"/>
               <a:t>Fifth level</a:t>
             </a:r>
-            <a:endParaRPr lang="en-US" dirty="0"/>
           </a:p>
         </p:txBody>
       </p:sp>
@@ -2497,7 +2460,7 @@
           <a:p>
             <a:fld id="{9C4D523F-9FD2-4F99-AE6A-5D4CF8E1EAC0}" type="datetime1">
               <a:rPr lang="en-US" smtClean="0"/>
-              <a:t>8/20/2015</a:t>
+              <a:t>8/1/2016</a:t>
             </a:fld>
             <a:endParaRPr lang="en-US"/>
           </a:p>
@@ -2555,13 +2518,6 @@
   <p:clrMapOvr>
     <a:masterClrMapping/>
   </p:clrMapOvr>
-  <p:timing>
-    <p:tnLst>
-      <p:par>
-        <p:cTn id="1" dur="indefinite" restart="never" nodeType="tmRoot"/>
-      </p:par>
-    </p:tnLst>
-  </p:timing>
 </p:sldLayout>
 </file>
 
@@ -2598,10 +2554,9 @@
           <a:lstStyle/>
           <a:p>
             <a:r>
-              <a:rPr lang="en-US" smtClean="0"/>
+              <a:rPr lang="en-US"/>
               <a:t>Click to edit Master title style</a:t>
             </a:r>
-            <a:endParaRPr lang="en-US"/>
           </a:p>
         </p:txBody>
       </p:sp>
@@ -2630,38 +2585,37 @@
           <a:p>
             <a:pPr lvl="0"/>
             <a:r>
-              <a:rPr lang="en-US" dirty="0" smtClean="0"/>
+              <a:rPr lang="en-US" dirty="0"/>
               <a:t>Click to edit Master text styles</a:t>
             </a:r>
           </a:p>
           <a:p>
             <a:pPr lvl="1"/>
             <a:r>
-              <a:rPr lang="en-US" dirty="0" smtClean="0"/>
+              <a:rPr lang="en-US" dirty="0"/>
               <a:t>Second level</a:t>
             </a:r>
           </a:p>
           <a:p>
             <a:pPr lvl="2"/>
             <a:r>
-              <a:rPr lang="en-US" dirty="0" smtClean="0"/>
+              <a:rPr lang="en-US" dirty="0"/>
               <a:t>Third level</a:t>
             </a:r>
           </a:p>
           <a:p>
             <a:pPr lvl="3"/>
             <a:r>
-              <a:rPr lang="en-US" dirty="0" smtClean="0"/>
+              <a:rPr lang="en-US" dirty="0"/>
               <a:t>Fourth level</a:t>
             </a:r>
           </a:p>
           <a:p>
             <a:pPr lvl="4"/>
             <a:r>
-              <a:rPr lang="en-US" dirty="0" smtClean="0"/>
+              <a:rPr lang="en-US" dirty="0"/>
               <a:t>Fifth level</a:t>
             </a:r>
-            <a:endParaRPr lang="en-US" dirty="0"/>
           </a:p>
         </p:txBody>
       </p:sp>
@@ -2682,7 +2636,7 @@
           <a:p>
             <a:fld id="{95ED224F-C888-43CC-95B4-07D174D2ACC3}" type="datetime1">
               <a:rPr lang="en-US" smtClean="0"/>
-              <a:t>8/20/2015</a:t>
+              <a:t>8/1/2016</a:t>
             </a:fld>
             <a:endParaRPr lang="en-US"/>
           </a:p>
@@ -2789,13 +2743,6 @@
   <p:clrMapOvr>
     <a:masterClrMapping/>
   </p:clrMapOvr>
-  <p:timing>
-    <p:tnLst>
-      <p:par>
-        <p:cTn id="1" dur="indefinite" restart="never" nodeType="tmRoot"/>
-      </p:par>
-    </p:tnLst>
-  </p:timing>
 </p:sldLayout>
 </file>
 
@@ -2841,10 +2788,9 @@
           </a:lstStyle>
           <a:p>
             <a:r>
-              <a:rPr lang="en-US" smtClean="0"/>
+              <a:rPr lang="en-US"/>
               <a:t>Click to edit Master title style</a:t>
             </a:r>
-            <a:endParaRPr lang="en-US"/>
           </a:p>
         </p:txBody>
       </p:sp>
@@ -2961,7 +2907,7 @@
           <a:p>
             <a:pPr lvl="0"/>
             <a:r>
-              <a:rPr lang="en-US" smtClean="0"/>
+              <a:rPr lang="en-US"/>
               <a:t>Click to edit Master text styles</a:t>
             </a:r>
           </a:p>
@@ -2984,7 +2930,7 @@
           <a:p>
             <a:fld id="{C39B90A9-1C43-4BAD-A088-E791992E0FFE}" type="datetime1">
               <a:rPr lang="en-US" smtClean="0"/>
-              <a:t>8/20/2015</a:t>
+              <a:t>8/1/2016</a:t>
             </a:fld>
             <a:endParaRPr lang="en-US"/>
           </a:p>
@@ -3078,10 +3024,9 @@
           <a:lstStyle/>
           <a:p>
             <a:r>
-              <a:rPr lang="en-US" smtClean="0"/>
+              <a:rPr lang="en-US"/>
               <a:t>Click to edit Master title style</a:t>
             </a:r>
-            <a:endParaRPr lang="en-US"/>
           </a:p>
         </p:txBody>
       </p:sp>
@@ -3135,38 +3080,37 @@
           <a:p>
             <a:pPr lvl="0"/>
             <a:r>
-              <a:rPr lang="en-US" smtClean="0"/>
+              <a:rPr lang="en-US"/>
               <a:t>Click to edit Master text styles</a:t>
             </a:r>
           </a:p>
           <a:p>
             <a:pPr lvl="1"/>
             <a:r>
-              <a:rPr lang="en-US" smtClean="0"/>
+              <a:rPr lang="en-US"/>
               <a:t>Second level</a:t>
             </a:r>
           </a:p>
           <a:p>
             <a:pPr lvl="2"/>
             <a:r>
-              <a:rPr lang="en-US" smtClean="0"/>
+              <a:rPr lang="en-US"/>
               <a:t>Third level</a:t>
             </a:r>
           </a:p>
           <a:p>
             <a:pPr lvl="3"/>
             <a:r>
-              <a:rPr lang="en-US" smtClean="0"/>
+              <a:rPr lang="en-US"/>
               <a:t>Fourth level</a:t>
             </a:r>
           </a:p>
           <a:p>
             <a:pPr lvl="4"/>
             <a:r>
-              <a:rPr lang="en-US" smtClean="0"/>
+              <a:rPr lang="en-US"/>
               <a:t>Fifth level</a:t>
             </a:r>
-            <a:endParaRPr lang="en-US"/>
           </a:p>
         </p:txBody>
       </p:sp>
@@ -3220,38 +3164,37 @@
           <a:p>
             <a:pPr lvl="0"/>
             <a:r>
-              <a:rPr lang="en-US" smtClean="0"/>
+              <a:rPr lang="en-US"/>
               <a:t>Click to edit Master text styles</a:t>
             </a:r>
           </a:p>
           <a:p>
             <a:pPr lvl="1"/>
             <a:r>
-              <a:rPr lang="en-US" smtClean="0"/>
+              <a:rPr lang="en-US"/>
               <a:t>Second level</a:t>
             </a:r>
           </a:p>
           <a:p>
             <a:pPr lvl="2"/>
             <a:r>
-              <a:rPr lang="en-US" smtClean="0"/>
+              <a:rPr lang="en-US"/>
               <a:t>Third level</a:t>
             </a:r>
           </a:p>
           <a:p>
             <a:pPr lvl="3"/>
             <a:r>
-              <a:rPr lang="en-US" smtClean="0"/>
+              <a:rPr lang="en-US"/>
               <a:t>Fourth level</a:t>
             </a:r>
           </a:p>
           <a:p>
             <a:pPr lvl="4"/>
             <a:r>
-              <a:rPr lang="en-US" smtClean="0"/>
+              <a:rPr lang="en-US"/>
               <a:t>Fifth level</a:t>
             </a:r>
-            <a:endParaRPr lang="en-US"/>
           </a:p>
         </p:txBody>
       </p:sp>
@@ -3272,7 +3215,7 @@
           <a:p>
             <a:fld id="{1CBCE65A-D548-441D-9CCA-F3277E55A5A8}" type="datetime1">
               <a:rPr lang="en-US" smtClean="0"/>
-              <a:t>8/20/2015</a:t>
+              <a:t>8/1/2016</a:t>
             </a:fld>
             <a:endParaRPr lang="en-US"/>
           </a:p>
@@ -3370,10 +3313,9 @@
           </a:lstStyle>
           <a:p>
             <a:r>
-              <a:rPr lang="en-US" smtClean="0"/>
+              <a:rPr lang="en-US"/>
               <a:t>Click to edit Master title style</a:t>
             </a:r>
-            <a:endParaRPr lang="en-US"/>
           </a:p>
         </p:txBody>
       </p:sp>
@@ -3436,7 +3378,7 @@
           <a:p>
             <a:pPr lvl="0"/>
             <a:r>
-              <a:rPr lang="en-US" smtClean="0"/>
+              <a:rPr lang="en-US"/>
               <a:t>Click to edit Master text styles</a:t>
             </a:r>
           </a:p>
@@ -3492,38 +3434,37 @@
           <a:p>
             <a:pPr lvl="0"/>
             <a:r>
-              <a:rPr lang="en-US" smtClean="0"/>
+              <a:rPr lang="en-US"/>
               <a:t>Click to edit Master text styles</a:t>
             </a:r>
           </a:p>
           <a:p>
             <a:pPr lvl="1"/>
             <a:r>
-              <a:rPr lang="en-US" smtClean="0"/>
+              <a:rPr lang="en-US"/>
               <a:t>Second level</a:t>
             </a:r>
           </a:p>
           <a:p>
             <a:pPr lvl="2"/>
             <a:r>
-              <a:rPr lang="en-US" smtClean="0"/>
+              <a:rPr lang="en-US"/>
               <a:t>Third level</a:t>
             </a:r>
           </a:p>
           <a:p>
             <a:pPr lvl="3"/>
             <a:r>
-              <a:rPr lang="en-US" smtClean="0"/>
+              <a:rPr lang="en-US"/>
               <a:t>Fourth level</a:t>
             </a:r>
           </a:p>
           <a:p>
             <a:pPr lvl="4"/>
             <a:r>
-              <a:rPr lang="en-US" smtClean="0"/>
+              <a:rPr lang="en-US"/>
               <a:t>Fifth level</a:t>
             </a:r>
-            <a:endParaRPr lang="en-US"/>
           </a:p>
         </p:txBody>
       </p:sp>
@@ -3586,7 +3527,7 @@
           <a:p>
             <a:pPr lvl="0"/>
             <a:r>
-              <a:rPr lang="en-US" smtClean="0"/>
+              <a:rPr lang="en-US"/>
               <a:t>Click to edit Master text styles</a:t>
             </a:r>
           </a:p>
@@ -3642,38 +3583,37 @@
           <a:p>
             <a:pPr lvl="0"/>
             <a:r>
-              <a:rPr lang="en-US" smtClean="0"/>
+              <a:rPr lang="en-US"/>
               <a:t>Click to edit Master text styles</a:t>
             </a:r>
           </a:p>
           <a:p>
             <a:pPr lvl="1"/>
             <a:r>
-              <a:rPr lang="en-US" smtClean="0"/>
+              <a:rPr lang="en-US"/>
               <a:t>Second level</a:t>
             </a:r>
           </a:p>
           <a:p>
             <a:pPr lvl="2"/>
             <a:r>
-              <a:rPr lang="en-US" smtClean="0"/>
+              <a:rPr lang="en-US"/>
               <a:t>Third level</a:t>
             </a:r>
           </a:p>
           <a:p>
             <a:pPr lvl="3"/>
             <a:r>
-              <a:rPr lang="en-US" smtClean="0"/>
+              <a:rPr lang="en-US"/>
               <a:t>Fourth level</a:t>
             </a:r>
           </a:p>
           <a:p>
             <a:pPr lvl="4"/>
             <a:r>
-              <a:rPr lang="en-US" smtClean="0"/>
+              <a:rPr lang="en-US"/>
               <a:t>Fifth level</a:t>
             </a:r>
-            <a:endParaRPr lang="en-US"/>
           </a:p>
         </p:txBody>
       </p:sp>
@@ -3694,7 +3634,7 @@
           <a:p>
             <a:fld id="{D70BEEC4-A792-4467-97A6-0C913164F4F7}" type="datetime1">
               <a:rPr lang="en-US" smtClean="0"/>
-              <a:t>8/20/2015</a:t>
+              <a:t>8/1/2016</a:t>
             </a:fld>
             <a:endParaRPr lang="en-US"/>
           </a:p>
@@ -3788,10 +3728,9 @@
           <a:lstStyle/>
           <a:p>
             <a:r>
-              <a:rPr lang="en-US" smtClean="0"/>
+              <a:rPr lang="en-US"/>
               <a:t>Click to edit Master title style</a:t>
             </a:r>
-            <a:endParaRPr lang="en-US"/>
           </a:p>
         </p:txBody>
       </p:sp>
@@ -3812,7 +3751,7 @@
           <a:p>
             <a:fld id="{27E5AA17-EA7F-4B89-A61B-12529B314781}" type="datetime1">
               <a:rPr lang="en-US" smtClean="0"/>
-              <a:t>8/20/2015</a:t>
+              <a:t>8/1/2016</a:t>
             </a:fld>
             <a:endParaRPr lang="en-US"/>
           </a:p>
@@ -3870,13 +3809,6 @@
   <p:clrMapOvr>
     <a:masterClrMapping/>
   </p:clrMapOvr>
-  <p:timing>
-    <p:tnLst>
-      <p:par>
-        <p:cTn id="1" dur="indefinite" restart="never" nodeType="tmRoot"/>
-      </p:par>
-    </p:tnLst>
-  </p:timing>
 </p:sldLayout>
 </file>
 
@@ -3940,10 +3872,9 @@
           <a:lstStyle/>
           <a:p>
             <a:r>
-              <a:rPr lang="en-US" smtClean="0"/>
+              <a:rPr lang="en-US"/>
               <a:t>Click to edit Master title style</a:t>
             </a:r>
-            <a:endParaRPr lang="en-US"/>
           </a:p>
         </p:txBody>
       </p:sp>
@@ -3974,38 +3905,37 @@
           <a:p>
             <a:pPr lvl="0"/>
             <a:r>
-              <a:rPr lang="en-US" smtClean="0"/>
+              <a:rPr lang="en-US"/>
               <a:t>Click to edit Master text styles</a:t>
             </a:r>
           </a:p>
           <a:p>
             <a:pPr lvl="1"/>
             <a:r>
-              <a:rPr lang="en-US" smtClean="0"/>
+              <a:rPr lang="en-US"/>
               <a:t>Second level</a:t>
             </a:r>
           </a:p>
           <a:p>
             <a:pPr lvl="2"/>
             <a:r>
-              <a:rPr lang="en-US" smtClean="0"/>
+              <a:rPr lang="en-US"/>
               <a:t>Third level</a:t>
             </a:r>
           </a:p>
           <a:p>
             <a:pPr lvl="3"/>
             <a:r>
-              <a:rPr lang="en-US" smtClean="0"/>
+              <a:rPr lang="en-US"/>
               <a:t>Fourth level</a:t>
             </a:r>
           </a:p>
           <a:p>
             <a:pPr lvl="4"/>
             <a:r>
-              <a:rPr lang="en-US" smtClean="0"/>
+              <a:rPr lang="en-US"/>
               <a:t>Fifth level</a:t>
             </a:r>
-            <a:endParaRPr lang="en-US"/>
           </a:p>
         </p:txBody>
       </p:sp>
@@ -4044,7 +3974,7 @@
           <a:p>
             <a:fld id="{476D3A80-EC65-47C4-9EA9-1E687F3E6B5B}" type="datetime1">
               <a:rPr lang="en-US" smtClean="0"/>
-              <a:t>8/20/2015</a:t>
+              <a:t>8/1/2016</a:t>
             </a:fld>
             <a:endParaRPr lang="en-US"/>
           </a:p>
@@ -4152,13 +4082,6 @@
     <p:sldLayoutId id="2147483673" r:id="rId13"/>
     <p:sldLayoutId id="2147483674" r:id="rId14"/>
   </p:sldLayoutIdLst>
-  <p:timing>
-    <p:tnLst>
-      <p:par>
-        <p:cTn id="1" dur="indefinite" restart="never" nodeType="tmRoot"/>
-      </p:par>
-    </p:tnLst>
-  </p:timing>
   <p:hf hdr="0" ftr="0" dt="0"/>
   <p:txStyles>
     <p:titleStyle>
@@ -4446,22 +4369,17 @@
           <a:lstStyle/>
           <a:p>
             <a:r>
-              <a:rPr lang="en-US" dirty="0" smtClean="0"/>
+              <a:rPr lang="en-US" dirty="0"/>
               <a:t>The </a:t>
             </a:r>
             <a:r>
-              <a:rPr lang="en-US" dirty="0" err="1" smtClean="0"/>
+              <a:rPr lang="en-US" dirty="0" err="1"/>
               <a:t>Draggable</a:t>
             </a:r>
             <a:r>
-              <a:rPr lang="en-US" dirty="0" smtClean="0"/>
-              <a:t> </a:t>
-            </a:r>
-            <a:r>
-              <a:rPr lang="en-US" dirty="0" smtClean="0"/>
-              <a:t>Cat</a:t>
-            </a:r>
-            <a:endParaRPr lang="en-US" dirty="0"/>
+              <a:rPr lang="en-US" dirty="0"/>
+              <a:t> Cat</a:t>
+            </a:r>
           </a:p>
         </p:txBody>
       </p:sp>
@@ -4481,21 +4399,21 @@
           <a:lstStyle/>
           <a:p>
             <a:r>
-              <a:rPr lang="en-US" dirty="0" smtClean="0"/>
+              <a:rPr lang="en-US" dirty="0"/>
               <a:t>CS 5010 Program Design Paradigms “</a:t>
             </a:r>
             <a:r>
-              <a:rPr lang="en-US" dirty="0" err="1" smtClean="0"/>
+              <a:rPr lang="en-US" dirty="0" err="1"/>
               <a:t>Bootcamp</a:t>
             </a:r>
             <a:r>
-              <a:rPr lang="en-US" dirty="0" smtClean="0"/>
+              <a:rPr lang="en-US" dirty="0"/>
               <a:t>”</a:t>
             </a:r>
           </a:p>
           <a:p>
             <a:r>
-              <a:rPr lang="en-US" dirty="0" smtClean="0"/>
+              <a:rPr lang="en-US" dirty="0"/>
               <a:t>Lesson 3.3</a:t>
             </a:r>
           </a:p>
@@ -4531,29 +4449,29 @@
           <a:lstStyle/>
           <a:p>
             <a:r>
-              <a:rPr lang="en-US" smtClean="0"/>
+              <a:rPr lang="en-US"/>
               <a:t>TexPoint fonts used in EMF. </a:t>
             </a:r>
           </a:p>
           <a:p>
             <a:r>
-              <a:rPr lang="en-US" smtClean="0"/>
+              <a:rPr lang="en-US"/>
               <a:t>Read the TexPoint manual before you delete this box.: </a:t>
             </a:r>
             <a:r>
-              <a:rPr lang="en-US" smtClean="0">
+              <a:rPr lang="en-US">
                 <a:latin typeface="CMMI10"/>
               </a:rPr>
               <a:t>A</a:t>
             </a:r>
             <a:r>
-              <a:rPr lang="en-US" smtClean="0">
+              <a:rPr lang="en-US">
                 <a:latin typeface="CMR10"/>
               </a:rPr>
               <a:t>A</a:t>
             </a:r>
             <a:r>
-              <a:rPr lang="en-US" smtClean="0">
+              <a:rPr lang="en-US">
                 <a:latin typeface="CMSY10ORIG"/>
               </a:rPr>
               <a:t>A</a:t>
@@ -4630,28 +4548,13 @@
             <a:p>
               <a:r>
                 <a:rPr lang="en-US" sz="1000" dirty="0"/>
-                <a:t>© Mitchell Wand, </a:t>
+                <a:t>© Mitchell Wand, 2012-2015</a:t>
               </a:r>
-              <a:r>
-                <a:rPr lang="en-US" sz="1000" dirty="0" smtClean="0"/>
-                <a:t>2012-2015</a:t>
-              </a:r>
-              <a:endParaRPr lang="en-US" sz="1000" dirty="0" smtClean="0"/>
             </a:p>
             <a:p>
               <a:r>
-                <a:rPr lang="en-US" sz="1000" dirty="0" smtClean="0"/>
+                <a:rPr lang="en-US" sz="1000" dirty="0"/>
                 <a:t>This work is licensed under a </a:t>
-              </a:r>
-              <a:r>
-                <a:rPr lang="en-US" altLang="en-US" sz="1000" dirty="0" smtClean="0">
-                  <a:solidFill>
-                    <a:srgbClr val="4374B7"/>
-                  </a:solidFill>
-                  <a:latin typeface="Helvetica Neue"/>
-                  <a:hlinkClick r:id="rId5"/>
-                </a:rPr>
-                <a:t>Creative </a:t>
               </a:r>
               <a:r>
                 <a:rPr lang="en-US" altLang="en-US" sz="1000" dirty="0">
@@ -4661,7 +4564,7 @@
                   <a:latin typeface="Helvetica Neue"/>
                   <a:hlinkClick r:id="rId5"/>
                 </a:rPr>
-                <a:t>Commons Attribution-</a:t>
+                <a:t>Creative Commons Attribution-</a:t>
               </a:r>
               <a:r>
                 <a:rPr lang="en-US" altLang="en-US" sz="1000" dirty="0" err="1">
@@ -4684,10 +4587,9 @@
                 <a:t> 4.0 International License</a:t>
               </a:r>
               <a:r>
-                <a:rPr lang="en-US" sz="1000" dirty="0" smtClean="0"/>
+                <a:rPr lang="en-US" sz="1000" dirty="0"/>
                 <a:t>.</a:t>
               </a:r>
-              <a:endParaRPr lang="en-US" sz="1000" dirty="0"/>
             </a:p>
           </p:txBody>
         </p:sp>
@@ -4720,13 +4622,6 @@
   <p:clrMapOvr>
     <a:masterClrMapping/>
   </p:clrMapOvr>
-  <p:timing>
-    <p:tnLst>
-      <p:par>
-        <p:cTn id="1" dur="indefinite" restart="never" nodeType="tmRoot"/>
-      </p:par>
-    </p:tnLst>
-  </p:timing>
 </p:sld>
 </file>
 
@@ -4763,10 +4658,9 @@
           <a:lstStyle/>
           <a:p>
             <a:r>
-              <a:rPr lang="en-US" dirty="0" smtClean="0"/>
+              <a:rPr lang="en-US" dirty="0"/>
               <a:t>Life cycle of a dragged, falling cat</a:t>
             </a:r>
-            <a:endParaRPr lang="en-US" dirty="0"/>
           </a:p>
         </p:txBody>
       </p:sp>
@@ -4806,7 +4700,7 @@
           <a:p>
             <a:pPr algn="ctr"/>
             <a:r>
-              <a:rPr lang="en-US" dirty="0" smtClean="0">
+              <a:rPr lang="en-US" dirty="0">
                 <a:solidFill>
                   <a:schemeClr val="tx1"/>
                 </a:solidFill>
@@ -4814,7 +4708,7 @@
               <a:t>(unselected, </a:t>
             </a:r>
             <a:r>
-              <a:rPr lang="en-US" dirty="0" err="1" smtClean="0">
+              <a:rPr lang="en-US" dirty="0" err="1">
                 <a:solidFill>
                   <a:schemeClr val="tx1"/>
                 </a:solidFill>
@@ -4822,7 +4716,7 @@
               <a:t>unpaused</a:t>
             </a:r>
             <a:r>
-              <a:rPr lang="en-US" dirty="0" smtClean="0">
+              <a:rPr lang="en-US" dirty="0">
                 <a:solidFill>
                   <a:schemeClr val="tx1"/>
                 </a:solidFill>
@@ -4868,7 +4762,7 @@
           <a:p>
             <a:pPr algn="ctr"/>
             <a:r>
-              <a:rPr lang="en-US" dirty="0" smtClean="0">
+              <a:rPr lang="en-US" dirty="0">
                 <a:solidFill>
                   <a:schemeClr val="tx1"/>
                 </a:solidFill>
@@ -4914,7 +4808,7 @@
           <a:p>
             <a:pPr algn="ctr"/>
             <a:r>
-              <a:rPr lang="en-US" dirty="0" smtClean="0">
+              <a:rPr lang="en-US" dirty="0">
                 <a:solidFill>
                   <a:schemeClr val="tx1"/>
                 </a:solidFill>
@@ -4960,7 +4854,7 @@
           <a:p>
             <a:pPr algn="ctr"/>
             <a:r>
-              <a:rPr lang="en-US" dirty="0" smtClean="0">
+              <a:rPr lang="en-US" dirty="0">
                 <a:solidFill>
                   <a:schemeClr val="tx1"/>
                 </a:solidFill>
@@ -4968,7 +4862,7 @@
               <a:t>(selected, </a:t>
             </a:r>
             <a:r>
-              <a:rPr lang="en-US" dirty="0" err="1" smtClean="0">
+              <a:rPr lang="en-US" dirty="0" err="1">
                 <a:solidFill>
                   <a:schemeClr val="tx1"/>
                 </a:solidFill>
@@ -4976,7 +4870,7 @@
               <a:t>unpaused</a:t>
             </a:r>
             <a:r>
-              <a:rPr lang="en-US" dirty="0" smtClean="0">
+              <a:rPr lang="en-US" dirty="0">
                 <a:solidFill>
                   <a:schemeClr val="tx1"/>
                 </a:solidFill>
@@ -5380,10 +5274,9 @@
           <a:lstStyle/>
           <a:p>
             <a:r>
-              <a:rPr lang="en-US" dirty="0" smtClean="0"/>
+              <a:rPr lang="en-US" dirty="0"/>
               <a:t>initial state</a:t>
             </a:r>
-            <a:endParaRPr lang="en-US" dirty="0"/>
           </a:p>
         </p:txBody>
       </p:sp>
@@ -5410,10 +5303,9 @@
           <a:lstStyle/>
           <a:p>
             <a:r>
-              <a:rPr lang="en-US" dirty="0" smtClean="0"/>
+              <a:rPr lang="en-US" dirty="0"/>
               <a:t>drag: cat follows mouse </a:t>
             </a:r>
-            <a:endParaRPr lang="en-US" dirty="0"/>
           </a:p>
         </p:txBody>
       </p:sp>
@@ -5440,10 +5332,9 @@
           <a:lstStyle/>
           <a:p>
             <a:r>
-              <a:rPr lang="en-US" dirty="0" smtClean="0"/>
+              <a:rPr lang="en-US" dirty="0"/>
               <a:t>button down</a:t>
             </a:r>
-            <a:endParaRPr lang="en-US" dirty="0"/>
           </a:p>
         </p:txBody>
       </p:sp>
@@ -5470,10 +5361,9 @@
           <a:lstStyle/>
           <a:p>
             <a:r>
-              <a:rPr lang="en-US" dirty="0" smtClean="0"/>
+              <a:rPr lang="en-US" dirty="0"/>
               <a:t>button up</a:t>
             </a:r>
-            <a:endParaRPr lang="en-US" dirty="0"/>
           </a:p>
         </p:txBody>
       </p:sp>
@@ -5500,10 +5390,9 @@
           <a:lstStyle/>
           <a:p>
             <a:r>
-              <a:rPr lang="en-US" dirty="0" smtClean="0"/>
+              <a:rPr lang="en-US" dirty="0"/>
               <a:t>space bar</a:t>
             </a:r>
-            <a:endParaRPr lang="en-US" dirty="0"/>
           </a:p>
         </p:txBody>
       </p:sp>
@@ -5530,10 +5419,9 @@
           <a:lstStyle/>
           <a:p>
             <a:r>
-              <a:rPr lang="en-US" dirty="0" smtClean="0"/>
+              <a:rPr lang="en-US" dirty="0"/>
               <a:t>space bar</a:t>
             </a:r>
-            <a:endParaRPr lang="en-US" dirty="0"/>
           </a:p>
         </p:txBody>
       </p:sp>
@@ -5560,10 +5448,9 @@
           <a:lstStyle/>
           <a:p>
             <a:r>
-              <a:rPr lang="en-US" dirty="0" smtClean="0"/>
+              <a:rPr lang="en-US" dirty="0"/>
               <a:t>button up</a:t>
             </a:r>
-            <a:endParaRPr lang="en-US" dirty="0"/>
           </a:p>
         </p:txBody>
       </p:sp>
@@ -5590,10 +5477,9 @@
           <a:lstStyle/>
           <a:p>
             <a:r>
-              <a:rPr lang="en-US" dirty="0" smtClean="0"/>
+              <a:rPr lang="en-US" dirty="0"/>
               <a:t>button down</a:t>
             </a:r>
-            <a:endParaRPr lang="en-US" dirty="0"/>
           </a:p>
         </p:txBody>
       </p:sp>
@@ -5620,10 +5506,9 @@
           <a:lstStyle/>
           <a:p>
             <a:r>
-              <a:rPr lang="en-US" dirty="0" smtClean="0"/>
+              <a:rPr lang="en-US" dirty="0"/>
               <a:t>space bar</a:t>
             </a:r>
-            <a:endParaRPr lang="en-US" dirty="0"/>
           </a:p>
         </p:txBody>
       </p:sp>
@@ -5650,10 +5535,9 @@
           <a:lstStyle/>
           <a:p>
             <a:r>
-              <a:rPr lang="en-US" dirty="0" smtClean="0"/>
+              <a:rPr lang="en-US" dirty="0"/>
               <a:t>space bar</a:t>
             </a:r>
-            <a:endParaRPr lang="en-US" dirty="0"/>
           </a:p>
         </p:txBody>
       </p:sp>
@@ -5680,10 +5564,9 @@
           <a:lstStyle/>
           <a:p>
             <a:r>
-              <a:rPr lang="en-US" dirty="0" smtClean="0"/>
+              <a:rPr lang="en-US" dirty="0"/>
               <a:t>drag: cat follows mouse </a:t>
             </a:r>
-            <a:endParaRPr lang="en-US" dirty="0"/>
           </a:p>
         </p:txBody>
       </p:sp>
@@ -5804,10 +5687,9 @@
           <a:lstStyle/>
           <a:p>
             <a:r>
-              <a:rPr lang="en-US" dirty="0" smtClean="0"/>
+              <a:rPr lang="en-US" dirty="0"/>
               <a:t>tick: cat falls</a:t>
             </a:r>
-            <a:endParaRPr lang="en-US" dirty="0"/>
           </a:p>
         </p:txBody>
       </p:sp>
@@ -5853,7 +5735,7 @@
           <a:p>
             <a:pPr algn="ctr"/>
             <a:r>
-              <a:rPr lang="en-US" dirty="0" smtClean="0">
+              <a:rPr lang="en-US" dirty="0">
                 <a:solidFill>
                   <a:schemeClr val="tx1"/>
                 </a:solidFill>
@@ -5896,13 +5778,6 @@
   <p:clrMapOvr>
     <a:masterClrMapping/>
   </p:clrMapOvr>
-  <p:timing>
-    <p:tnLst>
-      <p:par>
-        <p:cTn id="1" dur="indefinite" restart="never" nodeType="tmRoot"/>
-      </p:par>
-    </p:tnLst>
-  </p:timing>
 </p:sld>
 </file>
 
@@ -5939,10 +5814,9 @@
           <a:lstStyle/>
           <a:p>
             <a:r>
-              <a:rPr lang="en-US" dirty="0" smtClean="0"/>
+              <a:rPr lang="en-US" dirty="0"/>
               <a:t>Information Analysis: the Cat</a:t>
             </a:r>
-            <a:endParaRPr lang="en-US" dirty="0"/>
           </a:p>
         </p:txBody>
       </p:sp>
@@ -5967,16 +5841,11 @@
               <a:rPr lang="en-US" dirty="0"/>
               <a:t>As before, our world consists of a single cat. </a:t>
             </a:r>
-            <a:endParaRPr lang="en-US" dirty="0" smtClean="0"/>
-          </a:p>
-          <a:p>
-            <a:r>
-              <a:rPr lang="en-US" dirty="0" smtClean="0"/>
-              <a:t>Since the cat </a:t>
-            </a:r>
-            <a:r>
-              <a:rPr lang="en-US" dirty="0"/>
-              <a:t>can be dragged in the </a:t>
+          </a:p>
+          <a:p>
+            <a:r>
+              <a:rPr lang="en-US" dirty="0"/>
+              <a:t>Since the cat can be dragged in the </a:t>
             </a:r>
             <a:r>
               <a:rPr lang="en-US" b="1" dirty="0"/>
@@ -6002,27 +5871,17 @@
               <a:rPr lang="en-US" dirty="0"/>
               <a:t> position of the cat.  </a:t>
             </a:r>
-            <a:endParaRPr lang="en-US" dirty="0" smtClean="0"/>
-          </a:p>
-          <a:p>
-            <a:r>
-              <a:rPr lang="en-US" dirty="0" smtClean="0"/>
-              <a:t>We </a:t>
-            </a:r>
-            <a:r>
-              <a:rPr lang="en-US" dirty="0"/>
-              <a:t>also keep track of two Boolean values, telling us whether the cat is paused and whether the cat is selected. </a:t>
-            </a:r>
-            <a:endParaRPr lang="en-US" dirty="0" smtClean="0"/>
-          </a:p>
-          <a:p>
-            <a:r>
-              <a:rPr lang="en-US" dirty="0" smtClean="0"/>
-              <a:t>Here </a:t>
-            </a:r>
-            <a:r>
-              <a:rPr lang="en-US" dirty="0"/>
-              <a:t>is the data definition, including the template.</a:t>
+          </a:p>
+          <a:p>
+            <a:r>
+              <a:rPr lang="en-US" dirty="0"/>
+              <a:t>We also keep track of two Boolean values, telling us whether the cat is paused and whether the cat is selected. </a:t>
+            </a:r>
+          </a:p>
+          <a:p>
+            <a:r>
+              <a:rPr lang="en-US" dirty="0"/>
+              <a:t>Here is the data definition, including the template.</a:t>
             </a:r>
           </a:p>
           <a:p>
@@ -6063,13 +5922,6 @@
   <p:clrMapOvr>
     <a:masterClrMapping/>
   </p:clrMapOvr>
-  <p:timing>
-    <p:tnLst>
-      <p:par>
-        <p:cTn id="1" dur="indefinite" restart="never" nodeType="tmRoot"/>
-      </p:par>
-    </p:tnLst>
-  </p:timing>
 </p:sld>
 </file>
 
@@ -6106,10 +5958,9 @@
           <a:lstStyle/>
           <a:p>
             <a:r>
-              <a:rPr lang="en-US" dirty="0" smtClean="0"/>
+              <a:rPr lang="en-US" dirty="0"/>
               <a:t>Data Design for Cat</a:t>
             </a:r>
-            <a:endParaRPr lang="en-US" dirty="0"/>
           </a:p>
         </p:txBody>
       </p:sp>
@@ -6192,17 +6043,10 @@
                 <a:latin typeface="Consolas" pitchFamily="49" charset="0"/>
                 <a:cs typeface="Consolas" pitchFamily="49" charset="0"/>
               </a:rPr>
-              <a:t>;; A World is a (make-world </a:t>
-            </a:r>
-            <a:r>
-              <a:rPr lang="en-US" sz="2000" b="1" dirty="0" smtClean="0">
-                <a:latin typeface="Consolas" pitchFamily="49" charset="0"/>
-                <a:cs typeface="Consolas" pitchFamily="49" charset="0"/>
-              </a:rPr>
-              <a:t>Integer </a:t>
-            </a:r>
-            <a:r>
-              <a:rPr lang="en-US" sz="2000" b="1" smtClean="0">
+              <a:t>;; A World is a (make-world Integer </a:t>
+            </a:r>
+            <a:r>
+              <a:rPr lang="en-US" sz="2000" b="1">
                 <a:latin typeface="Consolas" pitchFamily="49" charset="0"/>
                 <a:cs typeface="Consolas" pitchFamily="49" charset="0"/>
               </a:rPr>
@@ -6289,14 +6133,7 @@
                 <a:latin typeface="Consolas" pitchFamily="49" charset="0"/>
                 <a:cs typeface="Consolas" pitchFamily="49" charset="0"/>
               </a:rPr>
-              <a:t>;; selected? describes whether or not the cat is selected</a:t>
-            </a:r>
-            <a:r>
-              <a:rPr lang="en-US" sz="2000" b="1" dirty="0" smtClean="0">
-                <a:latin typeface="Consolas" pitchFamily="49" charset="0"/>
-                <a:cs typeface="Consolas" pitchFamily="49" charset="0"/>
-              </a:rPr>
-              <a:t>.</a:t>
+              <a:t>;; selected? describes whether or not the cat is selected.</a:t>
             </a:r>
           </a:p>
           <a:p>
@@ -6411,28 +6248,17 @@
               </a:rPr>
               <a:t> w) </a:t>
             </a:r>
-            <a:endParaRPr lang="en-US" sz="2000" b="1" dirty="0" smtClean="0">
-              <a:latin typeface="Consolas" pitchFamily="49" charset="0"/>
-              <a:cs typeface="Consolas" pitchFamily="49" charset="0"/>
-            </a:endParaRPr>
           </a:p>
           <a:p>
             <a:pPr marL="0" indent="0">
               <a:buNone/>
             </a:pPr>
             <a:r>
-              <a:rPr lang="en-US" sz="2000" b="1" dirty="0" smtClean="0">
-                <a:latin typeface="Consolas" pitchFamily="49" charset="0"/>
-                <a:cs typeface="Consolas" pitchFamily="49" charset="0"/>
-              </a:rPr>
-              <a:t>;      (</a:t>
-            </a:r>
-            <a:r>
               <a:rPr lang="en-US" sz="2000" b="1" dirty="0">
                 <a:latin typeface="Consolas" pitchFamily="49" charset="0"/>
                 <a:cs typeface="Consolas" pitchFamily="49" charset="0"/>
               </a:rPr>
-              <a:t>world-paused? w) (world-selected? w)))</a:t>
+              <a:t>;      (world-paused? w) (world-selected? w)))</a:t>
             </a:r>
           </a:p>
         </p:txBody>
@@ -6470,13 +6296,6 @@
   <p:clrMapOvr>
     <a:masterClrMapping/>
   </p:clrMapOvr>
-  <p:timing>
-    <p:tnLst>
-      <p:par>
-        <p:cTn id="1" dur="indefinite" restart="never" nodeType="tmRoot"/>
-      </p:par>
-    </p:tnLst>
-  </p:timing>
 </p:sld>
 </file>
 
@@ -6513,10 +6332,9 @@
           <a:lstStyle/>
           <a:p>
             <a:r>
-              <a:rPr lang="en-US" dirty="0" smtClean="0"/>
+              <a:rPr lang="en-US" dirty="0"/>
               <a:t>Life Cycle of Mouse Movements</a:t>
             </a:r>
-            <a:endParaRPr lang="en-US" dirty="0"/>
           </a:p>
         </p:txBody>
       </p:sp>
@@ -6538,18 +6356,14 @@
           <a:lstStyle/>
           <a:p>
             <a:r>
-              <a:rPr lang="en-US" dirty="0" smtClean="0"/>
+              <a:rPr lang="en-US" dirty="0"/>
               <a:t>What are the possible movements of a mouse?</a:t>
             </a:r>
           </a:p>
           <a:p>
             <a:r>
-              <a:rPr lang="en-US" dirty="0" smtClean="0"/>
-              <a:t>Initially</a:t>
-            </a:r>
-            <a:r>
-              <a:rPr lang="en-US" dirty="0"/>
-              <a:t>, the mouse enters the canvas (an </a:t>
+              <a:rPr lang="en-US" dirty="0"/>
+              <a:t>Initially, the mouse enters the canvas (an </a:t>
             </a:r>
             <a:r>
               <a:rPr lang="en-US" b="1" dirty="0"/>
@@ -6559,16 +6373,11 @@
               <a:rPr lang="en-US" dirty="0"/>
               <a:t> event) and the button is up.  </a:t>
             </a:r>
-            <a:endParaRPr lang="en-US" dirty="0" smtClean="0"/>
-          </a:p>
-          <a:p>
-            <a:r>
-              <a:rPr lang="en-US" dirty="0" smtClean="0"/>
-              <a:t>While </a:t>
-            </a:r>
-            <a:r>
-              <a:rPr lang="en-US" dirty="0"/>
-              <a:t>the button is up, the user can only do 3 things:</a:t>
+          </a:p>
+          <a:p>
+            <a:r>
+              <a:rPr lang="en-US" dirty="0"/>
+              <a:t>While the button is up, the user can only do 3 things:</a:t>
             </a:r>
           </a:p>
           <a:p>
@@ -6664,16 +6473,12 @@
             </a:r>
             <a:r>
               <a:rPr lang="en-US" dirty="0"/>
-              <a:t> event</a:t>
-            </a:r>
-            <a:r>
-              <a:rPr lang="en-US" dirty="0" smtClean="0"/>
-              <a:t>)</a:t>
-            </a:r>
-          </a:p>
-          <a:p>
-            <a:r>
-              <a:rPr lang="en-US" dirty="0" smtClean="0"/>
+              <a:t> event)</a:t>
+            </a:r>
+          </a:p>
+          <a:p>
+            <a:r>
+              <a:rPr lang="en-US" dirty="0"/>
               <a:t>When the mouse is off the canvas, no events are possible.</a:t>
             </a:r>
           </a:p>
@@ -6725,13 +6530,6 @@
   <p:clrMapOvr>
     <a:masterClrMapping/>
   </p:clrMapOvr>
-  <p:timing>
-    <p:tnLst>
-      <p:par>
-        <p:cTn id="1" dur="indefinite" restart="never" nodeType="tmRoot"/>
-      </p:par>
-    </p:tnLst>
-  </p:timing>
 </p:sld>
 </file>
 
@@ -6789,10 +6587,9 @@
             <a:lstStyle/>
             <a:p>
               <a:r>
-                <a:rPr lang="en-US" dirty="0" smtClean="0"/>
+                <a:rPr lang="en-US" dirty="0"/>
                 <a:t>mouse enters canvas</a:t>
               </a:r>
-              <a:endParaRPr lang="en-US" dirty="0"/>
             </a:p>
           </p:txBody>
         </p:sp>
@@ -6822,7 +6619,7 @@
             <a:lstStyle/>
             <a:p>
               <a:r>
-                <a:rPr lang="en-US" dirty="0" smtClean="0">
+                <a:rPr lang="en-US" dirty="0">
                   <a:solidFill>
                     <a:schemeClr val="bg2">
                       <a:lumMod val="50000"/>
@@ -6831,13 +6628,6 @@
                 </a:rPr>
                 <a:t>mouse leaves canvas</a:t>
               </a:r>
-              <a:endParaRPr lang="en-US" dirty="0">
-                <a:solidFill>
-                  <a:schemeClr val="bg2">
-                    <a:lumMod val="50000"/>
-                  </a:schemeClr>
-                </a:solidFill>
-              </a:endParaRPr>
             </a:p>
           </p:txBody>
         </p:sp>
@@ -6883,7 +6673,7 @@
             <a:p>
               <a:pPr algn="ctr"/>
               <a:r>
-                <a:rPr lang="en-US" dirty="0" smtClean="0">
+                <a:rPr lang="en-US" dirty="0">
                   <a:solidFill>
                     <a:schemeClr val="bg2">
                       <a:lumMod val="50000"/>
@@ -6945,7 +6735,7 @@
               <a:p>
                 <a:pPr algn="ctr"/>
                 <a:r>
-                  <a:rPr lang="en-US" dirty="0" smtClean="0">
+                  <a:rPr lang="en-US" dirty="0">
                     <a:solidFill>
                       <a:schemeClr val="tx1"/>
                     </a:solidFill>
@@ -6991,7 +6781,7 @@
               <a:p>
                 <a:pPr algn="ctr"/>
                 <a:r>
-                  <a:rPr lang="en-US" dirty="0" smtClean="0">
+                  <a:rPr lang="en-US" dirty="0">
                     <a:solidFill>
                       <a:schemeClr val="tx1"/>
                     </a:solidFill>
@@ -7024,10 +6814,9 @@
               <a:lstStyle/>
               <a:p>
                 <a:r>
-                  <a:rPr lang="en-US" dirty="0" smtClean="0"/>
+                  <a:rPr lang="en-US" dirty="0"/>
                   <a:t>button-down</a:t>
                 </a:r>
-                <a:endParaRPr lang="en-US" dirty="0"/>
               </a:p>
             </p:txBody>
           </p:sp>
@@ -7054,10 +6843,9 @@
               <a:lstStyle/>
               <a:p>
                 <a:r>
-                  <a:rPr lang="en-US" dirty="0" smtClean="0"/>
+                  <a:rPr lang="en-US" dirty="0"/>
                   <a:t>drag mouse</a:t>
                 </a:r>
-                <a:endParaRPr lang="en-US" dirty="0"/>
               </a:p>
             </p:txBody>
           </p:sp>
@@ -7084,10 +6872,9 @@
               <a:lstStyle/>
               <a:p>
                 <a:r>
-                  <a:rPr lang="en-US" dirty="0" smtClean="0"/>
+                  <a:rPr lang="en-US" dirty="0"/>
                   <a:t>button-up</a:t>
                 </a:r>
-                <a:endParaRPr lang="en-US" dirty="0"/>
               </a:p>
             </p:txBody>
           </p:sp>
@@ -7114,10 +6901,9 @@
               <a:lstStyle/>
               <a:p>
                 <a:r>
-                  <a:rPr lang="en-US" dirty="0" smtClean="0"/>
+                  <a:rPr lang="en-US" dirty="0"/>
                   <a:t>move mouse</a:t>
                 </a:r>
-                <a:endParaRPr lang="en-US" dirty="0"/>
               </a:p>
             </p:txBody>
           </p:sp>
@@ -7521,7 +7307,7 @@
             <a:lstStyle/>
             <a:p>
               <a:r>
-                <a:rPr lang="en-US" dirty="0" smtClean="0">
+                <a:rPr lang="en-US" dirty="0">
                   <a:solidFill>
                     <a:schemeClr val="bg2">
                       <a:lumMod val="50000"/>
@@ -7530,13 +7316,6 @@
                 </a:rPr>
                 <a:t>mouse enters canvas</a:t>
               </a:r>
-              <a:endParaRPr lang="en-US" dirty="0">
-                <a:solidFill>
-                  <a:schemeClr val="bg2">
-                    <a:lumMod val="50000"/>
-                  </a:schemeClr>
-                </a:solidFill>
-              </a:endParaRPr>
             </a:p>
           </p:txBody>
         </p:sp>
@@ -7563,7 +7342,7 @@
             <a:lstStyle/>
             <a:p>
               <a:r>
-                <a:rPr lang="en-US" dirty="0" smtClean="0">
+                <a:rPr lang="en-US" dirty="0">
                   <a:solidFill>
                     <a:schemeClr val="bg2">
                       <a:lumMod val="50000"/>
@@ -7572,13 +7351,6 @@
                 </a:rPr>
                 <a:t>mouse enters canvas</a:t>
               </a:r>
-              <a:endParaRPr lang="en-US" dirty="0">
-                <a:solidFill>
-                  <a:schemeClr val="bg2">
-                    <a:lumMod val="50000"/>
-                  </a:schemeClr>
-                </a:solidFill>
-              </a:endParaRPr>
             </a:p>
           </p:txBody>
         </p:sp>
@@ -7599,10 +7371,9 @@
           <a:lstStyle/>
           <a:p>
             <a:r>
-              <a:rPr lang="en-US" dirty="0" smtClean="0"/>
+              <a:rPr lang="en-US" dirty="0"/>
               <a:t>Life Cycle of Mouse Movements</a:t>
             </a:r>
-            <a:endParaRPr lang="en-US" dirty="0"/>
           </a:p>
         </p:txBody>
       </p:sp>
@@ -7647,7 +7418,7 @@
           <a:lstStyle/>
           <a:p>
             <a:r>
-              <a:rPr lang="en-US" dirty="0" smtClean="0">
+              <a:rPr lang="en-US" dirty="0">
                 <a:solidFill>
                   <a:schemeClr val="tx1"/>
                 </a:solidFill>
@@ -7690,13 +7461,6 @@
   <p:clrMapOvr>
     <a:masterClrMapping/>
   </p:clrMapOvr>
-  <p:timing>
-    <p:tnLst>
-      <p:par>
-        <p:cTn id="1" dur="indefinite" restart="never" nodeType="tmRoot"/>
-      </p:par>
-    </p:tnLst>
-  </p:timing>
 </p:sld>
 </file>
 
@@ -7735,10 +7499,9 @@
           <a:lstStyle/>
           <a:p>
             <a:r>
-              <a:rPr lang="en-US" dirty="0" smtClean="0"/>
+              <a:rPr lang="en-US" dirty="0"/>
               <a:t>Information Analysis: Mouse Events</a:t>
             </a:r>
-            <a:endParaRPr lang="en-US" dirty="0"/>
           </a:p>
         </p:txBody>
       </p:sp>
@@ -7763,49 +7526,34 @@
               <a:rPr lang="en-US" dirty="0"/>
               <a:t>Looking at the life cycle of a dragged cat, we see that only three mouse events are relevant: </a:t>
             </a:r>
-            <a:endParaRPr lang="en-US" dirty="0" smtClean="0"/>
           </a:p>
           <a:p>
             <a:pPr lvl="1"/>
             <a:r>
-              <a:rPr lang="en-US" b="1" dirty="0" smtClean="0"/>
-              <a:t>"</a:t>
-            </a:r>
-            <a:r>
               <a:rPr lang="en-US" b="1" dirty="0"/>
-              <a:t>button-down"</a:t>
+              <a:t>"button-down"</a:t>
             </a:r>
             <a:r>
               <a:rPr lang="en-US" dirty="0"/>
               <a:t> , </a:t>
             </a:r>
-            <a:endParaRPr lang="en-US" dirty="0" smtClean="0"/>
           </a:p>
           <a:p>
             <a:pPr lvl="1"/>
             <a:r>
-              <a:rPr lang="en-US" b="1" dirty="0" smtClean="0"/>
-              <a:t>"</a:t>
-            </a:r>
-            <a:r>
               <a:rPr lang="en-US" b="1" dirty="0"/>
-              <a:t>drag"</a:t>
+              <a:t>"drag"</a:t>
             </a:r>
             <a:r>
               <a:rPr lang="en-US" dirty="0"/>
               <a:t>, and </a:t>
             </a:r>
-            <a:endParaRPr lang="en-US" dirty="0" smtClean="0"/>
           </a:p>
           <a:p>
             <a:pPr lvl="1"/>
             <a:r>
-              <a:rPr lang="en-US" b="1" dirty="0" smtClean="0"/>
-              <a:t>"</a:t>
-            </a:r>
-            <a:r>
               <a:rPr lang="en-US" b="1" dirty="0"/>
-              <a:t>button-up"</a:t>
+              <a:t>"button-up"</a:t>
             </a:r>
             <a:r>
               <a:rPr lang="en-US" dirty="0"/>
@@ -7815,16 +7563,11 @@
               <a:rPr lang="en-US" b="1" dirty="0"/>
               <a:t>  </a:t>
             </a:r>
-            <a:endParaRPr lang="en-US" b="1" dirty="0" smtClean="0"/>
-          </a:p>
-          <a:p>
-            <a:r>
-              <a:rPr lang="en-US" dirty="0" smtClean="0"/>
-              <a:t>Other </a:t>
-            </a:r>
-            <a:r>
-              <a:rPr lang="en-US" dirty="0"/>
-              <a:t>mouse events, like </a:t>
+          </a:p>
+          <a:p>
+            <a:r>
+              <a:rPr lang="en-US" dirty="0"/>
+              <a:t>Other mouse events, like </a:t>
             </a:r>
             <a:r>
               <a:rPr lang="en-US" b="1" dirty="0"/>
@@ -7850,26 +7593,20 @@
               <a:rPr lang="en-US" dirty="0"/>
               <a:t> are ignored.  </a:t>
             </a:r>
-            <a:endParaRPr lang="en-US" dirty="0" smtClean="0"/>
-          </a:p>
-          <a:p>
-            <a:r>
-              <a:rPr lang="en-US" dirty="0" smtClean="0"/>
+          </a:p>
+          <a:p>
+            <a:r>
+              <a:rPr lang="en-US" dirty="0"/>
               <a:t>We can write a template for doing cases on </a:t>
             </a:r>
             <a:r>
-              <a:rPr lang="en-US" dirty="0" err="1" smtClean="0"/>
+              <a:rPr lang="en-US" dirty="0" err="1"/>
               <a:t>MouseEvents</a:t>
             </a:r>
             <a:r>
               <a:rPr lang="en-US" dirty="0"/>
-              <a:t> </a:t>
-            </a:r>
-            <a:r>
-              <a:rPr lang="en-US" dirty="0" smtClean="0"/>
-              <a:t>for this application:</a:t>
-            </a:r>
-            <a:endParaRPr lang="en-US" dirty="0"/>
+              <a:t> for this application:</a:t>
+            </a:r>
           </a:p>
         </p:txBody>
       </p:sp>
@@ -7906,13 +7643,6 @@
   <p:clrMapOvr>
     <a:masterClrMapping/>
   </p:clrMapOvr>
-  <p:timing>
-    <p:tnLst>
-      <p:par>
-        <p:cTn id="1" dur="indefinite" restart="never" nodeType="tmRoot"/>
-      </p:par>
-    </p:tnLst>
-  </p:timing>
 </p:sld>
 </file>
 
@@ -7949,18 +7679,9 @@
           <a:lstStyle/>
           <a:p>
             <a:r>
-              <a:rPr lang="en-US" dirty="0" smtClean="0"/>
-              <a:t>Case analysis for mouse </a:t>
-            </a:r>
-            <a:r>
-              <a:rPr lang="en-US" dirty="0" smtClean="0"/>
-              <a:t>ev</a:t>
-            </a:r>
-            <a:r>
-              <a:rPr lang="en-US" dirty="0" smtClean="0"/>
-              <a:t>ents</a:t>
-            </a:r>
-            <a:endParaRPr lang="en-US" dirty="0"/>
+              <a:rPr lang="en-US" dirty="0"/>
+              <a:t>Case analysis for mouse events</a:t>
+            </a:r>
           </a:p>
         </p:txBody>
       </p:sp>
@@ -7988,7 +7709,7 @@
               <a:buNone/>
             </a:pPr>
             <a:r>
-              <a:rPr lang="en-US" sz="2000" b="1" dirty="0" smtClean="0">
+              <a:rPr lang="en-US" sz="2000" b="1" dirty="0">
                 <a:latin typeface="Consolas" panose="020B0609020204030204" pitchFamily="49" charset="0"/>
                 <a:cs typeface="Consolas" panose="020B0609020204030204" pitchFamily="49" charset="0"/>
               </a:rPr>
@@ -8009,32 +7730,18 @@
               <a:t> : </a:t>
             </a:r>
             <a:r>
-              <a:rPr lang="en-US" sz="2000" b="1" dirty="0" err="1" smtClean="0">
+              <a:rPr lang="en-US" sz="2000" b="1" dirty="0" err="1">
                 <a:latin typeface="Consolas" panose="020B0609020204030204" pitchFamily="49" charset="0"/>
                 <a:cs typeface="Consolas" panose="020B0609020204030204" pitchFamily="49" charset="0"/>
               </a:rPr>
               <a:t>MouseEvent</a:t>
-            </a:r>
-            <a:r>
-              <a:rPr lang="en-US" sz="2000" b="1" dirty="0" smtClean="0">
-                <a:latin typeface="Consolas" panose="020B0609020204030204" pitchFamily="49" charset="0"/>
-                <a:cs typeface="Consolas" panose="020B0609020204030204" pitchFamily="49" charset="0"/>
-              </a:rPr>
-              <a:t> </a:t>
             </a:r>
             <a:r>
               <a:rPr lang="en-US" sz="2000" b="1" dirty="0">
                 <a:latin typeface="Consolas" panose="020B0609020204030204" pitchFamily="49" charset="0"/>
                 <a:cs typeface="Consolas" panose="020B0609020204030204" pitchFamily="49" charset="0"/>
               </a:rPr>
-              <a:t>-&gt; </a:t>
-            </a:r>
-            <a:r>
-              <a:rPr lang="en-US" sz="2000" b="1" dirty="0" smtClean="0">
-                <a:latin typeface="Consolas" panose="020B0609020204030204" pitchFamily="49" charset="0"/>
-                <a:cs typeface="Consolas" panose="020B0609020204030204" pitchFamily="49" charset="0"/>
-              </a:rPr>
-              <a:t>??</a:t>
+              <a:t> -&gt; ??</a:t>
             </a:r>
           </a:p>
           <a:p>
@@ -8045,28 +7752,28 @@
               <a:buNone/>
             </a:pPr>
             <a:r>
-              <a:rPr lang="en-US" sz="2000" b="1" dirty="0" smtClean="0">
+              <a:rPr lang="en-US" sz="2000" b="1" dirty="0">
                 <a:latin typeface="Consolas" panose="020B0609020204030204" pitchFamily="49" charset="0"/>
                 <a:cs typeface="Consolas" panose="020B0609020204030204" pitchFamily="49" charset="0"/>
               </a:rPr>
               <a:t>; STRATEGY: Cases on </a:t>
             </a:r>
             <a:r>
-              <a:rPr lang="en-US" sz="2000" b="1" dirty="0" err="1" smtClean="0">
+              <a:rPr lang="en-US" sz="2000" b="1" dirty="0" err="1">
                 <a:latin typeface="Consolas" panose="020B0609020204030204" pitchFamily="49" charset="0"/>
                 <a:cs typeface="Consolas" panose="020B0609020204030204" pitchFamily="49" charset="0"/>
               </a:rPr>
               <a:t>MouseEvent</a:t>
             </a:r>
             <a:r>
-              <a:rPr lang="en-US" sz="2000" b="1" dirty="0" smtClean="0">
+              <a:rPr lang="en-US" sz="2000" b="1" dirty="0">
                 <a:latin typeface="Consolas" panose="020B0609020204030204" pitchFamily="49" charset="0"/>
                 <a:cs typeface="Consolas" panose="020B0609020204030204" pitchFamily="49" charset="0"/>
               </a:rPr>
               <a:t> </a:t>
             </a:r>
             <a:r>
-              <a:rPr lang="en-US" sz="2000" b="1" dirty="0" err="1" smtClean="0">
+              <a:rPr lang="en-US" sz="2000" b="1" dirty="0" err="1">
                 <a:latin typeface="Consolas" panose="020B0609020204030204" pitchFamily="49" charset="0"/>
                 <a:cs typeface="Consolas" panose="020B0609020204030204" pitchFamily="49" charset="0"/>
               </a:rPr>
@@ -8253,44 +7960,12 @@
               <a:buNone/>
             </a:pPr>
             <a:r>
-              <a:rPr lang="en-US" sz="2800" dirty="0" smtClean="0">
+              <a:rPr lang="en-US" sz="2800" dirty="0">
                 <a:latin typeface="+mj-lt"/>
                 <a:cs typeface="Consolas" pitchFamily="49" charset="0"/>
               </a:rPr>
-              <a:t>We won’t require you to write down this template</a:t>
-            </a:r>
-            <a:r>
-              <a:rPr lang="en-US" sz="2800" dirty="0" smtClean="0">
-                <a:latin typeface="+mj-lt"/>
-                <a:cs typeface="Consolas" pitchFamily="49" charset="0"/>
-              </a:rPr>
-              <a:t>, but you may find that writing it down is helpful, </a:t>
-            </a:r>
-            <a:r>
-              <a:rPr lang="en-US" sz="2800" dirty="0" smtClean="0">
-                <a:latin typeface="+mj-lt"/>
-                <a:cs typeface="Consolas" pitchFamily="49" charset="0"/>
-              </a:rPr>
-              <a:t>since </a:t>
-            </a:r>
-            <a:r>
-              <a:rPr lang="en-US" sz="2800" dirty="0" smtClean="0">
-                <a:latin typeface="+mj-lt"/>
-                <a:cs typeface="Consolas" pitchFamily="49" charset="0"/>
-              </a:rPr>
-              <a:t>you are likely to </a:t>
-            </a:r>
-            <a:r>
-              <a:rPr lang="en-US" sz="2800" dirty="0" smtClean="0">
-                <a:latin typeface="+mj-lt"/>
-                <a:cs typeface="Consolas" pitchFamily="49" charset="0"/>
-              </a:rPr>
-              <a:t>use the same set of cases several times in your program.</a:t>
-            </a:r>
-            <a:endParaRPr lang="en-US" sz="2800" dirty="0">
-              <a:latin typeface="+mj-lt"/>
-              <a:cs typeface="Consolas" pitchFamily="49" charset="0"/>
-            </a:endParaRPr>
+              <a:t>We won’t require you to write down this template, but you may find that writing it down is helpful, since you are likely to use the same set of cases several times in your program.</a:t>
+            </a:r>
           </a:p>
         </p:txBody>
       </p:sp>
@@ -8327,13 +8002,6 @@
   <p:clrMapOvr>
     <a:masterClrMapping/>
   </p:clrMapOvr>
-  <p:timing>
-    <p:tnLst>
-      <p:par>
-        <p:cTn id="1" dur="indefinite" restart="never" nodeType="tmRoot"/>
-      </p:par>
-    </p:tnLst>
-  </p:timing>
 </p:sld>
 </file>
 
@@ -8372,10 +8040,9 @@
           <a:lstStyle/>
           <a:p>
             <a:r>
-              <a:rPr lang="en-US" dirty="0" smtClean="0"/>
+              <a:rPr lang="en-US" dirty="0"/>
               <a:t>Getting your old program to work with the new data definitions</a:t>
             </a:r>
-            <a:endParaRPr lang="en-US" dirty="0"/>
           </a:p>
         </p:txBody>
       </p:sp>
@@ -8397,40 +8064,40 @@
           <a:lstStyle/>
           <a:p>
             <a:r>
-              <a:rPr lang="en-US" dirty="0" smtClean="0"/>
+              <a:rPr lang="en-US" dirty="0"/>
               <a:t>Don't try adding the new features yet!</a:t>
             </a:r>
           </a:p>
           <a:p>
             <a:r>
-              <a:rPr lang="en-US" dirty="0" smtClean="0"/>
+              <a:rPr lang="en-US" dirty="0"/>
               <a:t>First, get all your old functions working with the new data definitions.</a:t>
             </a:r>
           </a:p>
           <a:p>
             <a:r>
-              <a:rPr lang="en-US" dirty="0" smtClean="0"/>
+              <a:rPr lang="en-US" dirty="0"/>
               <a:t>Make sure your old tests work</a:t>
             </a:r>
           </a:p>
           <a:p>
             <a:pPr lvl="1"/>
             <a:r>
-              <a:rPr lang="en-US" dirty="0" smtClean="0"/>
+              <a:rPr lang="en-US" dirty="0"/>
               <a:t>Don't change your tests!</a:t>
             </a:r>
           </a:p>
           <a:p>
             <a:pPr lvl="1"/>
             <a:r>
-              <a:rPr lang="en-US" dirty="0" smtClean="0"/>
+              <a:rPr lang="en-US" dirty="0"/>
               <a:t>If you used mostly symbolic names for the test inputs and outputs, so you should be able to just change those definitions.</a:t>
             </a:r>
           </a:p>
           <a:p>
             <a:pPr lvl="1"/>
             <a:r>
-              <a:rPr lang="en-US" dirty="0" smtClean="0"/>
+              <a:rPr lang="en-US" dirty="0"/>
               <a:t>The tests themselves should work unchanged.</a:t>
             </a:r>
           </a:p>
@@ -8469,13 +8136,6 @@
   <p:clrMapOvr>
     <a:masterClrMapping/>
   </p:clrMapOvr>
-  <p:timing>
-    <p:tnLst>
-      <p:par>
-        <p:cTn id="1" dur="indefinite" restart="never" nodeType="tmRoot"/>
-      </p:par>
-    </p:tnLst>
-  </p:timing>
 </p:sld>
 </file>
 
@@ -8512,10 +8172,9 @@
           <a:lstStyle/>
           <a:p>
             <a:r>
-              <a:rPr lang="en-US" dirty="0" smtClean="0"/>
+              <a:rPr lang="en-US" dirty="0"/>
               <a:t>Testing your old functions</a:t>
             </a:r>
-            <a:endParaRPr lang="en-US" dirty="0"/>
           </a:p>
         </p:txBody>
       </p:sp>
@@ -8546,10 +8205,6 @@
               </a:rPr>
               <a:t>(define unpaused-world-at-20 </a:t>
             </a:r>
-            <a:endParaRPr lang="en-US" sz="1800" b="1" dirty="0" smtClean="0">
-              <a:latin typeface="Consolas" pitchFamily="49" charset="0"/>
-              <a:cs typeface="Consolas" pitchFamily="49" charset="0"/>
-            </a:endParaRPr>
           </a:p>
           <a:p>
             <a:pPr marL="0" indent="0">
@@ -8560,21 +8215,7 @@
                 <a:latin typeface="Consolas" pitchFamily="49" charset="0"/>
                 <a:cs typeface="Consolas" pitchFamily="49" charset="0"/>
               </a:rPr>
-              <a:t> </a:t>
-            </a:r>
-            <a:r>
-              <a:rPr lang="en-US" sz="1800" b="1" dirty="0" smtClean="0">
-                <a:latin typeface="Consolas" pitchFamily="49" charset="0"/>
-                <a:cs typeface="Consolas" pitchFamily="49" charset="0"/>
-              </a:rPr>
-              <a:t> (</a:t>
-            </a:r>
-            <a:r>
-              <a:rPr lang="en-US" sz="1800" b="1" dirty="0">
-                <a:latin typeface="Consolas" pitchFamily="49" charset="0"/>
-                <a:cs typeface="Consolas" pitchFamily="49" charset="0"/>
-              </a:rPr>
-              <a:t>make-world CAT-X-COORD 20 false </a:t>
+              <a:t>  (make-world CAT-X-COORD 20 false </a:t>
             </a:r>
             <a:r>
               <a:rPr lang="en-US" sz="1800" b="1" dirty="0">
@@ -8605,10 +8246,6 @@
               </a:rPr>
               <a:t>(define paused-world-at-20   </a:t>
             </a:r>
-            <a:endParaRPr lang="en-US" sz="1800" b="1" dirty="0" smtClean="0">
-              <a:latin typeface="Consolas" pitchFamily="49" charset="0"/>
-              <a:cs typeface="Consolas" pitchFamily="49" charset="0"/>
-            </a:endParaRPr>
           </a:p>
           <a:p>
             <a:pPr marL="0" indent="0">
@@ -8619,21 +8256,7 @@
                 <a:latin typeface="Consolas" pitchFamily="49" charset="0"/>
                 <a:cs typeface="Consolas" pitchFamily="49" charset="0"/>
               </a:rPr>
-              <a:t> </a:t>
-            </a:r>
-            <a:r>
-              <a:rPr lang="en-US" sz="1800" b="1" dirty="0" smtClean="0">
-                <a:latin typeface="Consolas" pitchFamily="49" charset="0"/>
-                <a:cs typeface="Consolas" pitchFamily="49" charset="0"/>
-              </a:rPr>
-              <a:t> (</a:t>
-            </a:r>
-            <a:r>
-              <a:rPr lang="en-US" sz="1800" b="1" dirty="0">
-                <a:latin typeface="Consolas" pitchFamily="49" charset="0"/>
-                <a:cs typeface="Consolas" pitchFamily="49" charset="0"/>
-              </a:rPr>
-              <a:t>make-world CAT-X-COORD 20 true </a:t>
+              <a:t>  (make-world CAT-X-COORD 20 true </a:t>
             </a:r>
             <a:r>
               <a:rPr lang="en-US" sz="1800" b="1" dirty="0">
@@ -8664,10 +8287,6 @@
               </a:rPr>
               <a:t>(define unpaused-world-at-28 </a:t>
             </a:r>
-            <a:endParaRPr lang="en-US" sz="1800" b="1" dirty="0" smtClean="0">
-              <a:latin typeface="Consolas" pitchFamily="49" charset="0"/>
-              <a:cs typeface="Consolas" pitchFamily="49" charset="0"/>
-            </a:endParaRPr>
           </a:p>
           <a:p>
             <a:pPr marL="0" indent="0">
@@ -8678,21 +8297,7 @@
                 <a:latin typeface="Consolas" pitchFamily="49" charset="0"/>
                 <a:cs typeface="Consolas" pitchFamily="49" charset="0"/>
               </a:rPr>
-              <a:t> </a:t>
-            </a:r>
-            <a:r>
-              <a:rPr lang="en-US" sz="1800" b="1" dirty="0" smtClean="0">
-                <a:latin typeface="Consolas" pitchFamily="49" charset="0"/>
-                <a:cs typeface="Consolas" pitchFamily="49" charset="0"/>
-              </a:rPr>
-              <a:t> (</a:t>
-            </a:r>
-            <a:r>
-              <a:rPr lang="en-US" sz="1800" b="1" dirty="0">
-                <a:latin typeface="Consolas" pitchFamily="49" charset="0"/>
-                <a:cs typeface="Consolas" pitchFamily="49" charset="0"/>
-              </a:rPr>
-              <a:t>make-world CAT-X-COORD 28 false </a:t>
+              <a:t>  (make-world CAT-X-COORD 28 false </a:t>
             </a:r>
             <a:r>
               <a:rPr lang="en-US" sz="1800" b="1" dirty="0">
@@ -8723,10 +8328,6 @@
               </a:rPr>
               <a:t>(define paused-world-at-28   </a:t>
             </a:r>
-            <a:endParaRPr lang="en-US" sz="1800" b="1" dirty="0" smtClean="0">
-              <a:latin typeface="Consolas" pitchFamily="49" charset="0"/>
-              <a:cs typeface="Consolas" pitchFamily="49" charset="0"/>
-            </a:endParaRPr>
           </a:p>
           <a:p>
             <a:pPr marL="0" indent="0">
@@ -8737,21 +8338,7 @@
                 <a:latin typeface="Consolas" pitchFamily="49" charset="0"/>
                 <a:cs typeface="Consolas" pitchFamily="49" charset="0"/>
               </a:rPr>
-              <a:t> </a:t>
-            </a:r>
-            <a:r>
-              <a:rPr lang="en-US" sz="1800" b="1" dirty="0" smtClean="0">
-                <a:latin typeface="Consolas" pitchFamily="49" charset="0"/>
-                <a:cs typeface="Consolas" pitchFamily="49" charset="0"/>
-              </a:rPr>
-              <a:t> (</a:t>
-            </a:r>
-            <a:r>
-              <a:rPr lang="en-US" sz="1800" b="1" dirty="0">
-                <a:latin typeface="Consolas" pitchFamily="49" charset="0"/>
-                <a:cs typeface="Consolas" pitchFamily="49" charset="0"/>
-              </a:rPr>
-              <a:t>make-world CAT-X-COORD 28 true </a:t>
+              <a:t>  (make-world CAT-X-COORD 28 true </a:t>
             </a:r>
             <a:r>
               <a:rPr lang="en-US" sz="1800" b="1" dirty="0">
@@ -8764,7 +8351,7 @@
               <a:t>false</a:t>
             </a:r>
             <a:r>
-              <a:rPr lang="en-US" sz="1800" b="1" dirty="0" smtClean="0">
+              <a:rPr lang="en-US" sz="1800" b="1" dirty="0">
                 <a:latin typeface="Consolas" pitchFamily="49" charset="0"/>
                 <a:cs typeface="Consolas" pitchFamily="49" charset="0"/>
               </a:rPr>
@@ -8776,7 +8363,7 @@
               <a:buNone/>
             </a:pPr>
             <a:r>
-              <a:rPr lang="en-US" sz="1800" b="1" dirty="0" smtClean="0">
+              <a:rPr lang="en-US" sz="1800" b="1" dirty="0">
                 <a:latin typeface="Consolas" pitchFamily="49" charset="0"/>
                 <a:cs typeface="Consolas" pitchFamily="49" charset="0"/>
               </a:rPr>
@@ -8788,18 +8375,11 @@
               <a:buNone/>
             </a:pPr>
             <a:r>
-              <a:rPr lang="en-US" sz="1800" b="1" dirty="0" smtClean="0">
-                <a:latin typeface="Consolas" pitchFamily="49" charset="0"/>
-                <a:cs typeface="Consolas" pitchFamily="49" charset="0"/>
-              </a:rPr>
-              <a:t>(</a:t>
-            </a:r>
-            <a:r>
               <a:rPr lang="en-US" sz="1800" b="1" dirty="0">
                 <a:latin typeface="Consolas" pitchFamily="49" charset="0"/>
                 <a:cs typeface="Consolas" pitchFamily="49" charset="0"/>
               </a:rPr>
-              <a:t>check-equal?</a:t>
+              <a:t>(check-equal?</a:t>
             </a:r>
           </a:p>
           <a:p>
@@ -8807,18 +8387,11 @@
               <a:buNone/>
             </a:pPr>
             <a:r>
-              <a:rPr lang="en-US" sz="1800" b="1" dirty="0" smtClean="0">
-                <a:latin typeface="Consolas" pitchFamily="49" charset="0"/>
-                <a:cs typeface="Consolas" pitchFamily="49" charset="0"/>
-              </a:rPr>
-              <a:t>  </a:t>
-            </a:r>
-            <a:r>
               <a:rPr lang="en-US" sz="1800" b="1" dirty="0">
                 <a:latin typeface="Consolas" pitchFamily="49" charset="0"/>
                 <a:cs typeface="Consolas" pitchFamily="49" charset="0"/>
               </a:rPr>
-              <a:t>(world-after-key-event paused-world-at-20 pause-key-event)</a:t>
+              <a:t>  (world-after-key-event paused-world-at-20 pause-key-event)</a:t>
             </a:r>
           </a:p>
           <a:p>
@@ -8826,18 +8399,11 @@
               <a:buNone/>
             </a:pPr>
             <a:r>
-              <a:rPr lang="en-US" sz="1800" b="1" dirty="0" smtClean="0">
-                <a:latin typeface="Consolas" pitchFamily="49" charset="0"/>
-                <a:cs typeface="Consolas" pitchFamily="49" charset="0"/>
-              </a:rPr>
-              <a:t>  </a:t>
-            </a:r>
-            <a:r>
               <a:rPr lang="en-US" sz="1800" b="1" dirty="0">
                 <a:latin typeface="Consolas" pitchFamily="49" charset="0"/>
                 <a:cs typeface="Consolas" pitchFamily="49" charset="0"/>
               </a:rPr>
-              <a:t>unpaused-world-at-20</a:t>
+              <a:t>  unpaused-world-at-20</a:t>
             </a:r>
           </a:p>
           <a:p>
@@ -8845,18 +8411,11 @@
               <a:buNone/>
             </a:pPr>
             <a:r>
-              <a:rPr lang="en-US" sz="1800" b="1" dirty="0" smtClean="0">
-                <a:latin typeface="Consolas" pitchFamily="49" charset="0"/>
-                <a:cs typeface="Consolas" pitchFamily="49" charset="0"/>
-              </a:rPr>
-              <a:t>  "</a:t>
-            </a:r>
-            <a:r>
               <a:rPr lang="en-US" sz="1800" b="1" dirty="0">
                 <a:latin typeface="Consolas" pitchFamily="49" charset="0"/>
                 <a:cs typeface="Consolas" pitchFamily="49" charset="0"/>
               </a:rPr>
-              <a:t>after pause key, a paused world should become </a:t>
+              <a:t>  "after pause key, a paused world should become </a:t>
             </a:r>
             <a:r>
               <a:rPr lang="en-US" sz="1800" b="1" dirty="0" err="1">
@@ -8911,10 +8470,9 @@
           <a:lstStyle/>
           <a:p>
             <a:r>
-              <a:rPr lang="en-US" dirty="0" smtClean="0"/>
+              <a:rPr lang="en-US" dirty="0"/>
               <a:t>same tests</a:t>
             </a:r>
-            <a:endParaRPr lang="en-US" dirty="0"/>
           </a:p>
         </p:txBody>
       </p:sp>
@@ -8968,10 +8526,9 @@
             <a:lstStyle/>
             <a:p>
               <a:r>
-                <a:rPr lang="en-US" dirty="0" smtClean="0"/>
+                <a:rPr lang="en-US" dirty="0"/>
                 <a:t>adjusted values</a:t>
               </a:r>
-              <a:endParaRPr lang="en-US" dirty="0"/>
             </a:p>
           </p:txBody>
         </p:sp>
@@ -9328,10 +8885,9 @@
           <a:lstStyle/>
           <a:p>
             <a:r>
-              <a:rPr lang="en-US" dirty="0" smtClean="0"/>
+              <a:rPr lang="en-US" dirty="0"/>
               <a:t>Everything OK?</a:t>
             </a:r>
-            <a:endParaRPr lang="en-US" dirty="0"/>
           </a:p>
         </p:txBody>
       </p:sp>
@@ -9351,10 +8907,9 @@
           <a:lstStyle/>
           <a:p>
             <a:r>
-              <a:rPr lang="en-US" dirty="0" smtClean="0"/>
+              <a:rPr lang="en-US" dirty="0"/>
               <a:t>Good.  Now we are ready to move on to the new features.</a:t>
             </a:r>
-            <a:endParaRPr lang="en-US" dirty="0"/>
           </a:p>
         </p:txBody>
       </p:sp>
@@ -9391,13 +8946,6 @@
   <p:clrMapOvr>
     <a:masterClrMapping/>
   </p:clrMapOvr>
-  <p:timing>
-    <p:tnLst>
-      <p:par>
-        <p:cTn id="1" dur="indefinite" restart="never" nodeType="tmRoot"/>
-      </p:par>
-    </p:tnLst>
-  </p:timing>
 </p:sld>
 </file>
 
@@ -9434,10 +8982,9 @@
           <a:lstStyle/>
           <a:p>
             <a:r>
-              <a:rPr lang="en-US" dirty="0" smtClean="0"/>
+              <a:rPr lang="en-US" dirty="0"/>
               <a:t>Introduction</a:t>
             </a:r>
-            <a:endParaRPr lang="en-US" dirty="0"/>
           </a:p>
         </p:txBody>
       </p:sp>
@@ -9469,7 +9016,6 @@
               <a:rPr lang="en-US" sz="2800" dirty="0"/>
               <a:t>In this lesson, you will learn how to make a Universe program that responds to mouse events, but more importantly, you will learn how to systematically add new features to a working program. </a:t>
             </a:r>
-            <a:endParaRPr lang="en-US" sz="2800" dirty="0" smtClean="0"/>
           </a:p>
           <a:p>
             <a:pPr marL="0" indent="0">
@@ -9490,20 +9036,8 @@
               <a:defRPr/>
             </a:pPr>
             <a:r>
-              <a:rPr lang="en-US" sz="2800" dirty="0" smtClean="0"/>
-              <a:t>This </a:t>
-            </a:r>
-            <a:r>
               <a:rPr lang="en-US" sz="2800" dirty="0"/>
-              <a:t>is important, because we always build systems by starting with a small but working program, and then </a:t>
-            </a:r>
-            <a:r>
-              <a:rPr lang="en-US" sz="2800" dirty="0" smtClean="0"/>
-              <a:t>adding </a:t>
-            </a:r>
-            <a:r>
-              <a:rPr lang="en-US" sz="2800" dirty="0"/>
-              <a:t>refinements and features.</a:t>
+              <a:t>This is important, because we always build systems by starting with a small but working program, and then adding refinements and features.</a:t>
             </a:r>
           </a:p>
           <a:p>
@@ -9550,13 +9084,6 @@
   <p:clrMapOvr>
     <a:masterClrMapping/>
   </p:clrMapOvr>
-  <p:timing>
-    <p:tnLst>
-      <p:par>
-        <p:cTn id="1" dur="indefinite" restart="never" nodeType="tmRoot"/>
-      </p:par>
-    </p:tnLst>
-  </p:timing>
 </p:sld>
 </file>
 
@@ -9593,10 +9120,9 @@
           <a:lstStyle/>
           <a:p>
             <a:r>
-              <a:rPr lang="en-US" dirty="0" smtClean="0"/>
+              <a:rPr lang="en-US" dirty="0"/>
               <a:t>Responding to Mouse Events</a:t>
             </a:r>
-            <a:endParaRPr lang="en-US" dirty="0"/>
           </a:p>
         </p:txBody>
       </p:sp>
@@ -9621,7 +9147,7 @@
               <a:buNone/>
             </a:pPr>
             <a:r>
-              <a:rPr lang="en-US" sz="2000" b="1" dirty="0" smtClean="0">
+              <a:rPr lang="en-US" sz="2000" b="1" dirty="0">
                 <a:latin typeface="Consolas" pitchFamily="49" charset="0"/>
                 <a:cs typeface="Consolas" pitchFamily="49" charset="0"/>
               </a:rPr>
@@ -9633,7 +9159,7 @@
               <a:buNone/>
             </a:pPr>
             <a:r>
-              <a:rPr lang="en-US" sz="2000" b="1" dirty="0" smtClean="0">
+              <a:rPr lang="en-US" sz="2000" b="1" dirty="0">
                 <a:latin typeface="Consolas" pitchFamily="49" charset="0"/>
                 <a:cs typeface="Consolas" pitchFamily="49" charset="0"/>
               </a:rPr>
@@ -9644,75 +9170,71 @@
             <a:pPr>
               <a:buNone/>
             </a:pPr>
-            <a:endParaRPr lang="en-US" sz="2000" b="1" dirty="0" smtClean="0">
-              <a:latin typeface="Consolas" pitchFamily="49" charset="0"/>
-              <a:cs typeface="Consolas" pitchFamily="49" charset="0"/>
-            </a:endParaRPr>
-          </a:p>
-          <a:p>
-            <a:pPr>
-              <a:buNone/>
-            </a:pPr>
-            <a:endParaRPr lang="en-US" sz="2000" b="1" dirty="0" smtClean="0">
-              <a:latin typeface="Consolas" pitchFamily="49" charset="0"/>
-              <a:cs typeface="Consolas" pitchFamily="49" charset="0"/>
-            </a:endParaRPr>
-          </a:p>
-          <a:p>
-            <a:pPr>
-              <a:buNone/>
-            </a:pPr>
-            <a:r>
-              <a:rPr lang="en-US" sz="2000" b="1" dirty="0" smtClean="0">
-                <a:latin typeface="Consolas" pitchFamily="49" charset="0"/>
-                <a:cs typeface="Consolas" pitchFamily="49" charset="0"/>
-              </a:rPr>
-              <a:t>world-after-mouse-event : </a:t>
-            </a:r>
-          </a:p>
-          <a:p>
-            <a:pPr>
-              <a:buNone/>
-            </a:pPr>
-            <a:r>
-              <a:rPr lang="en-US" sz="2000" b="1" dirty="0" smtClean="0">
-                <a:latin typeface="Consolas" pitchFamily="49" charset="0"/>
-                <a:cs typeface="Consolas" pitchFamily="49" charset="0"/>
-              </a:rPr>
-              <a:t>  World Integer </a:t>
-            </a:r>
-            <a:r>
-              <a:rPr lang="en-US" sz="2000" b="1" dirty="0" err="1" smtClean="0">
-                <a:latin typeface="Consolas" pitchFamily="49" charset="0"/>
-                <a:cs typeface="Consolas" pitchFamily="49" charset="0"/>
-              </a:rPr>
-              <a:t>Integer</a:t>
-            </a:r>
-            <a:r>
-              <a:rPr lang="en-US" sz="2000" b="1" dirty="0" smtClean="0">
-                <a:latin typeface="Consolas" pitchFamily="49" charset="0"/>
-                <a:cs typeface="Consolas" pitchFamily="49" charset="0"/>
-              </a:rPr>
-              <a:t> </a:t>
-            </a:r>
-            <a:r>
-              <a:rPr lang="en-US" sz="2000" b="1" dirty="0" err="1" smtClean="0">
-                <a:latin typeface="Consolas" pitchFamily="49" charset="0"/>
-                <a:cs typeface="Consolas" pitchFamily="49" charset="0"/>
-              </a:rPr>
-              <a:t>MouseEvent</a:t>
-            </a:r>
-            <a:r>
-              <a:rPr lang="en-US" sz="2000" b="1" dirty="0" smtClean="0">
-                <a:latin typeface="Consolas" pitchFamily="49" charset="0"/>
-                <a:cs typeface="Consolas" pitchFamily="49" charset="0"/>
-              </a:rPr>
-              <a:t> -&gt; World</a:t>
-            </a:r>
             <a:endParaRPr lang="en-US" sz="2000" b="1" dirty="0">
               <a:latin typeface="Consolas" pitchFamily="49" charset="0"/>
               <a:cs typeface="Consolas" pitchFamily="49" charset="0"/>
             </a:endParaRPr>
+          </a:p>
+          <a:p>
+            <a:pPr>
+              <a:buNone/>
+            </a:pPr>
+            <a:endParaRPr lang="en-US" sz="2000" b="1" dirty="0">
+              <a:latin typeface="Consolas" pitchFamily="49" charset="0"/>
+              <a:cs typeface="Consolas" pitchFamily="49" charset="0"/>
+            </a:endParaRPr>
+          </a:p>
+          <a:p>
+            <a:pPr>
+              <a:buNone/>
+            </a:pPr>
+            <a:r>
+              <a:rPr lang="en-US" sz="2000" b="1" dirty="0">
+                <a:latin typeface="Consolas" pitchFamily="49" charset="0"/>
+                <a:cs typeface="Consolas" pitchFamily="49" charset="0"/>
+              </a:rPr>
+              <a:t>world-after-mouse-event : </a:t>
+            </a:r>
+          </a:p>
+          <a:p>
+            <a:pPr>
+              <a:buNone/>
+            </a:pPr>
+            <a:r>
+              <a:rPr lang="en-US" sz="2000" b="1" dirty="0">
+                <a:latin typeface="Consolas" pitchFamily="49" charset="0"/>
+                <a:cs typeface="Consolas" pitchFamily="49" charset="0"/>
+              </a:rPr>
+              <a:t>  World Integer </a:t>
+            </a:r>
+            <a:r>
+              <a:rPr lang="en-US" sz="2000" b="1" dirty="0" err="1">
+                <a:latin typeface="Consolas" pitchFamily="49" charset="0"/>
+                <a:cs typeface="Consolas" pitchFamily="49" charset="0"/>
+              </a:rPr>
+              <a:t>Integer</a:t>
+            </a:r>
+            <a:r>
+              <a:rPr lang="en-US" sz="2000" b="1" dirty="0">
+                <a:latin typeface="Consolas" pitchFamily="49" charset="0"/>
+                <a:cs typeface="Consolas" pitchFamily="49" charset="0"/>
+              </a:rPr>
+              <a:t> </a:t>
+            </a:r>
+            <a:r>
+              <a:rPr lang="en-US" sz="2000" b="1" dirty="0" err="1">
+                <a:latin typeface="Consolas" pitchFamily="49" charset="0"/>
+                <a:cs typeface="Consolas" pitchFamily="49" charset="0"/>
+              </a:rPr>
+              <a:t>MouseEvent</a:t>
+            </a:r>
+            <a:r>
+              <a:rPr lang="en-US" sz="2000" b="1" dirty="0">
+                <a:latin typeface="Consolas" pitchFamily="49" charset="0"/>
+                <a:cs typeface="Consolas" pitchFamily="49" charset="0"/>
+              </a:rPr>
+              <a:t> -&gt; World</a:t>
+            </a:r>
           </a:p>
         </p:txBody>
       </p:sp>
@@ -9808,13 +9330,6 @@
   <p:clrMapOvr>
     <a:masterClrMapping/>
   </p:clrMapOvr>
-  <p:timing>
-    <p:tnLst>
-      <p:par>
-        <p:cTn id="1" dur="indefinite" restart="never" nodeType="tmRoot"/>
-      </p:par>
-    </p:tnLst>
-  </p:timing>
 </p:sld>
 </file>
 
@@ -9853,35 +9368,180 @@
           <a:lstStyle/>
           <a:p>
             <a:r>
-              <a:rPr lang="en-US" b="1" dirty="0" smtClean="0">
+              <a:rPr lang="en-US" b="1" dirty="0">
                 <a:latin typeface="Consolas" pitchFamily="49" charset="0"/>
                 <a:cs typeface="Consolas" pitchFamily="49" charset="0"/>
               </a:rPr>
               <a:t>world-after-mouse-event</a:t>
+            </a:r>
+          </a:p>
+        </p:txBody>
+      </p:sp>
+      <p:sp>
+        <p:nvSpPr>
+          <p:cNvPr id="3" name="Content Placeholder 2"/>
+          <p:cNvSpPr>
+            <a:spLocks noGrp="1"/>
+          </p:cNvSpPr>
+          <p:nvPr>
+            <p:ph idx="1"/>
+          </p:nvPr>
+        </p:nvSpPr>
+        <p:spPr/>
+        <p:txBody>
+          <a:bodyPr>
+            <a:normAutofit fontScale="55000" lnSpcReduction="20000"/>
+          </a:bodyPr>
+          <a:lstStyle/>
+          <a:p>
+            <a:pPr marL="0" indent="0">
+              <a:buNone/>
+            </a:pPr>
+            <a:r>
+              <a:rPr lang="en-US" b="1" dirty="0">
+                <a:latin typeface="Consolas" pitchFamily="49" charset="0"/>
+                <a:cs typeface="Consolas" pitchFamily="49" charset="0"/>
+              </a:rPr>
+              <a:t>;; world-after-mouse-event : </a:t>
+            </a:r>
+          </a:p>
+          <a:p>
+            <a:pPr marL="0" indent="0">
+              <a:buNone/>
+            </a:pPr>
+            <a:r>
+              <a:rPr lang="en-US" b="1" dirty="0">
+                <a:latin typeface="Consolas" pitchFamily="49" charset="0"/>
+                <a:cs typeface="Consolas" pitchFamily="49" charset="0"/>
+              </a:rPr>
+              <a:t>;;    World Integer </a:t>
+            </a:r>
+            <a:r>
+              <a:rPr lang="en-US" b="1" dirty="0" err="1">
+                <a:latin typeface="Consolas" pitchFamily="49" charset="0"/>
+                <a:cs typeface="Consolas" pitchFamily="49" charset="0"/>
+              </a:rPr>
+              <a:t>Integer</a:t>
+            </a:r>
+            <a:r>
+              <a:rPr lang="en-US" b="1" dirty="0">
+                <a:latin typeface="Consolas" pitchFamily="49" charset="0"/>
+                <a:cs typeface="Consolas" pitchFamily="49" charset="0"/>
+              </a:rPr>
+              <a:t> </a:t>
+            </a:r>
+            <a:r>
+              <a:rPr lang="en-US" b="1" dirty="0" err="1">
+                <a:latin typeface="Consolas" pitchFamily="49" charset="0"/>
+                <a:cs typeface="Consolas" pitchFamily="49" charset="0"/>
+              </a:rPr>
+              <a:t>FallingCatMouseEvent</a:t>
+            </a:r>
+            <a:r>
+              <a:rPr lang="en-US" b="1" dirty="0">
+                <a:latin typeface="Consolas" pitchFamily="49" charset="0"/>
+                <a:cs typeface="Consolas" pitchFamily="49" charset="0"/>
+              </a:rPr>
+              <a:t> </a:t>
+            </a:r>
+          </a:p>
+          <a:p>
+            <a:pPr marL="0" indent="0">
+              <a:buNone/>
+            </a:pPr>
+            <a:r>
+              <a:rPr lang="en-US" b="1" dirty="0">
+                <a:latin typeface="Consolas" pitchFamily="49" charset="0"/>
+                <a:cs typeface="Consolas" pitchFamily="49" charset="0"/>
+              </a:rPr>
+              <a:t>;;    -&gt; World</a:t>
+            </a:r>
+          </a:p>
+          <a:p>
+            <a:pPr marL="0" indent="0">
+              <a:buNone/>
+            </a:pPr>
+            <a:r>
+              <a:rPr lang="en-US" b="1" dirty="0">
+                <a:latin typeface="Consolas" pitchFamily="49" charset="0"/>
+                <a:cs typeface="Consolas" pitchFamily="49" charset="0"/>
+              </a:rPr>
+              <a:t>;; RETURNS: the world that should follow the given mouse event</a:t>
+            </a:r>
+          </a:p>
+          <a:p>
+            <a:pPr marL="0" indent="0">
+              <a:buNone/>
+            </a:pPr>
+            <a:r>
+              <a:rPr lang="en-US" b="1" dirty="0">
+                <a:latin typeface="Consolas" pitchFamily="49" charset="0"/>
+                <a:cs typeface="Consolas" pitchFamily="49" charset="0"/>
+              </a:rPr>
+              <a:t>;; examples:  See slide on life cycle of dragged cat</a:t>
+            </a:r>
+          </a:p>
+          <a:p>
+            <a:pPr marL="0" indent="0">
+              <a:buNone/>
+            </a:pPr>
+            <a:r>
+              <a:rPr lang="en-US" b="1" dirty="0">
+                <a:latin typeface="Consolas" pitchFamily="49" charset="0"/>
+                <a:cs typeface="Consolas" pitchFamily="49" charset="0"/>
+              </a:rPr>
+              <a:t>;; strategy: cases on mouse events</a:t>
+            </a:r>
+          </a:p>
+          <a:p>
+            <a:pPr marL="0" indent="0">
+              <a:buNone/>
+            </a:pPr>
+            <a:r>
+              <a:rPr lang="en-US" b="1" dirty="0">
+                <a:latin typeface="Consolas" pitchFamily="49" charset="0"/>
+                <a:cs typeface="Consolas" pitchFamily="49" charset="0"/>
+              </a:rPr>
+              <a:t>(define (world-after-mouse-event w mx my </a:t>
+            </a:r>
+            <a:r>
+              <a:rPr lang="en-US" b="1" dirty="0" err="1">
+                <a:latin typeface="Consolas" pitchFamily="49" charset="0"/>
+                <a:cs typeface="Consolas" pitchFamily="49" charset="0"/>
+              </a:rPr>
+              <a:t>mev</a:t>
+            </a:r>
+            <a:r>
+              <a:rPr lang="en-US" b="1" dirty="0">
+                <a:latin typeface="Consolas" pitchFamily="49" charset="0"/>
+                <a:cs typeface="Consolas" pitchFamily="49" charset="0"/>
+              </a:rPr>
+              <a:t>)</a:t>
+            </a:r>
+          </a:p>
+          <a:p>
+            <a:pPr marL="0" indent="0">
+              <a:buNone/>
+            </a:pPr>
+            <a:r>
+              <a:rPr lang="en-US" b="1" dirty="0">
+                <a:latin typeface="Consolas" pitchFamily="49" charset="0"/>
+                <a:cs typeface="Consolas" pitchFamily="49" charset="0"/>
+              </a:rPr>
+              <a:t>  (</a:t>
+            </a:r>
+            <a:r>
+              <a:rPr lang="en-US" b="1" dirty="0" err="1">
+                <a:latin typeface="Consolas" pitchFamily="49" charset="0"/>
+                <a:cs typeface="Consolas" pitchFamily="49" charset="0"/>
+              </a:rPr>
+              <a:t>cond</a:t>
             </a:r>
             <a:endParaRPr lang="en-US" b="1" dirty="0">
               <a:latin typeface="Consolas" pitchFamily="49" charset="0"/>
               <a:cs typeface="Consolas" pitchFamily="49" charset="0"/>
             </a:endParaRPr>
           </a:p>
-        </p:txBody>
-      </p:sp>
-      <p:sp>
-        <p:nvSpPr>
-          <p:cNvPr id="3" name="Content Placeholder 2"/>
-          <p:cNvSpPr>
-            <a:spLocks noGrp="1"/>
-          </p:cNvSpPr>
-          <p:nvPr>
-            <p:ph idx="1"/>
-          </p:nvPr>
-        </p:nvSpPr>
-        <p:spPr/>
-        <p:txBody>
-          <a:bodyPr>
-            <a:normAutofit fontScale="55000" lnSpcReduction="20000"/>
-          </a:bodyPr>
-          <a:lstStyle/>
           <a:p>
             <a:pPr marL="0" indent="0">
               <a:buNone/>
@@ -9891,74 +9551,71 @@
                 <a:latin typeface="Consolas" pitchFamily="49" charset="0"/>
                 <a:cs typeface="Consolas" pitchFamily="49" charset="0"/>
               </a:rPr>
-              <a:t>;; world-after-mouse-event : </a:t>
-            </a:r>
-            <a:endParaRPr lang="en-US" b="1" dirty="0" smtClean="0">
-              <a:latin typeface="Consolas" pitchFamily="49" charset="0"/>
-              <a:cs typeface="Consolas" pitchFamily="49" charset="0"/>
-            </a:endParaRPr>
+              <a:t>    [(mouse=? </a:t>
+            </a:r>
+            <a:r>
+              <a:rPr lang="en-US" b="1" dirty="0" err="1">
+                <a:latin typeface="Consolas" pitchFamily="49" charset="0"/>
+                <a:cs typeface="Consolas" pitchFamily="49" charset="0"/>
+              </a:rPr>
+              <a:t>mev</a:t>
+            </a:r>
+            <a:r>
+              <a:rPr lang="en-US" b="1" dirty="0">
+                <a:latin typeface="Consolas" pitchFamily="49" charset="0"/>
+                <a:cs typeface="Consolas" pitchFamily="49" charset="0"/>
+              </a:rPr>
+              <a:t> "button-down") </a:t>
+            </a:r>
           </a:p>
           <a:p>
             <a:pPr marL="0" indent="0">
               <a:buNone/>
             </a:pPr>
             <a:r>
-              <a:rPr lang="en-US" b="1" dirty="0" smtClean="0">
+              <a:rPr lang="en-US" b="1" dirty="0">
                 <a:latin typeface="Consolas" pitchFamily="49" charset="0"/>
                 <a:cs typeface="Consolas" pitchFamily="49" charset="0"/>
               </a:rPr>
-              <a:t>;;    World Integer </a:t>
-            </a:r>
-            <a:r>
-              <a:rPr lang="en-US" b="1" dirty="0" err="1" smtClean="0">
+              <a:t>     (world-after-button-down w mx my)]</a:t>
+            </a:r>
+          </a:p>
+          <a:p>
+            <a:pPr marL="0" indent="0">
+              <a:buNone/>
+            </a:pPr>
+            <a:r>
+              <a:rPr lang="en-US" b="1" dirty="0">
                 <a:latin typeface="Consolas" pitchFamily="49" charset="0"/>
                 <a:cs typeface="Consolas" pitchFamily="49" charset="0"/>
               </a:rPr>
-              <a:t>Integer</a:t>
-            </a:r>
-            <a:r>
-              <a:rPr lang="en-US" b="1" dirty="0" smtClean="0">
-                <a:latin typeface="Consolas" pitchFamily="49" charset="0"/>
-                <a:cs typeface="Consolas" pitchFamily="49" charset="0"/>
-              </a:rPr>
-              <a:t> </a:t>
+              <a:t>    [(mouse=? </a:t>
             </a:r>
             <a:r>
               <a:rPr lang="en-US" b="1" dirty="0" err="1">
                 <a:latin typeface="Consolas" pitchFamily="49" charset="0"/>
                 <a:cs typeface="Consolas" pitchFamily="49" charset="0"/>
               </a:rPr>
-              <a:t>FallingCatMouseEvent</a:t>
+              <a:t>mev</a:t>
             </a:r>
             <a:r>
               <a:rPr lang="en-US" b="1" dirty="0">
                 <a:latin typeface="Consolas" pitchFamily="49" charset="0"/>
                 <a:cs typeface="Consolas" pitchFamily="49" charset="0"/>
               </a:rPr>
-              <a:t> </a:t>
-            </a:r>
-            <a:endParaRPr lang="en-US" b="1" dirty="0" smtClean="0">
-              <a:latin typeface="Consolas" pitchFamily="49" charset="0"/>
-              <a:cs typeface="Consolas" pitchFamily="49" charset="0"/>
-            </a:endParaRPr>
+              <a:t> "drag") </a:t>
+            </a:r>
           </a:p>
           <a:p>
             <a:pPr marL="0" indent="0">
               <a:buNone/>
             </a:pPr>
             <a:r>
-              <a:rPr lang="en-US" b="1" dirty="0" smtClean="0">
-                <a:latin typeface="Consolas" pitchFamily="49" charset="0"/>
-                <a:cs typeface="Consolas" pitchFamily="49" charset="0"/>
-              </a:rPr>
-              <a:t>;;    -&gt; </a:t>
-            </a:r>
-            <a:r>
               <a:rPr lang="en-US" b="1" dirty="0">
                 <a:latin typeface="Consolas" pitchFamily="49" charset="0"/>
                 <a:cs typeface="Consolas" pitchFamily="49" charset="0"/>
               </a:rPr>
-              <a:t>World</a:t>
+              <a:t>     (world-after-drag w mx my)]</a:t>
             </a:r>
           </a:p>
           <a:p>
@@ -9970,21 +9627,21 @@
                 <a:latin typeface="Consolas" pitchFamily="49" charset="0"/>
                 <a:cs typeface="Consolas" pitchFamily="49" charset="0"/>
               </a:rPr>
-              <a:t>;; </a:t>
-            </a:r>
-            <a:r>
-              <a:rPr lang="en-US" b="1" dirty="0" smtClean="0">
+              <a:t>    [(mouse=? </a:t>
+            </a:r>
+            <a:r>
+              <a:rPr lang="en-US" b="1" dirty="0" err="1">
                 <a:latin typeface="Consolas" pitchFamily="49" charset="0"/>
                 <a:cs typeface="Consolas" pitchFamily="49" charset="0"/>
               </a:rPr>
-              <a:t>produces </a:t>
+              <a:t>mev</a:t>
             </a:r>
             <a:r>
               <a:rPr lang="en-US" b="1" dirty="0">
                 <a:latin typeface="Consolas" pitchFamily="49" charset="0"/>
                 <a:cs typeface="Consolas" pitchFamily="49" charset="0"/>
               </a:rPr>
-              <a:t>the world that should follow the given mouse event</a:t>
+              <a:t> "button-up")</a:t>
             </a:r>
           </a:p>
           <a:p>
@@ -9996,260 +9653,7 @@
                 <a:latin typeface="Consolas" pitchFamily="49" charset="0"/>
                 <a:cs typeface="Consolas" pitchFamily="49" charset="0"/>
               </a:rPr>
-              <a:t>;; examples:  See slide on life cycle of dragged cat</a:t>
-            </a:r>
-          </a:p>
-          <a:p>
-            <a:pPr marL="0" indent="0">
-              <a:buNone/>
-            </a:pPr>
-            <a:r>
-              <a:rPr lang="en-US" b="1" dirty="0">
-                <a:latin typeface="Consolas" pitchFamily="49" charset="0"/>
-                <a:cs typeface="Consolas" pitchFamily="49" charset="0"/>
-              </a:rPr>
-              <a:t>;; strategy</a:t>
-            </a:r>
-            <a:r>
-              <a:rPr lang="en-US" b="1">
-                <a:latin typeface="Consolas" pitchFamily="49" charset="0"/>
-                <a:cs typeface="Consolas" pitchFamily="49" charset="0"/>
-              </a:rPr>
-              <a:t>: </a:t>
-            </a:r>
-            <a:r>
-              <a:rPr lang="en-US" b="1" smtClean="0">
-                <a:latin typeface="Consolas" pitchFamily="49" charset="0"/>
-                <a:cs typeface="Consolas" pitchFamily="49" charset="0"/>
-              </a:rPr>
-              <a:t>cases </a:t>
-            </a:r>
-            <a:r>
-              <a:rPr lang="en-US" b="1" dirty="0">
-                <a:latin typeface="Consolas" pitchFamily="49" charset="0"/>
-                <a:cs typeface="Consolas" pitchFamily="49" charset="0"/>
-              </a:rPr>
-              <a:t>on mouse events</a:t>
-            </a:r>
-          </a:p>
-          <a:p>
-            <a:pPr marL="0" indent="0">
-              <a:buNone/>
-            </a:pPr>
-            <a:r>
-              <a:rPr lang="en-US" b="1" dirty="0">
-                <a:latin typeface="Consolas" pitchFamily="49" charset="0"/>
-                <a:cs typeface="Consolas" pitchFamily="49" charset="0"/>
-              </a:rPr>
-              <a:t>(define (world-after-mouse-event w mx my </a:t>
-            </a:r>
-            <a:r>
-              <a:rPr lang="en-US" b="1" dirty="0" err="1">
-                <a:latin typeface="Consolas" pitchFamily="49" charset="0"/>
-                <a:cs typeface="Consolas" pitchFamily="49" charset="0"/>
-              </a:rPr>
-              <a:t>mev</a:t>
-            </a:r>
-            <a:r>
-              <a:rPr lang="en-US" b="1" dirty="0">
-                <a:latin typeface="Consolas" pitchFamily="49" charset="0"/>
-                <a:cs typeface="Consolas" pitchFamily="49" charset="0"/>
-              </a:rPr>
-              <a:t>)</a:t>
-            </a:r>
-          </a:p>
-          <a:p>
-            <a:pPr marL="0" indent="0">
-              <a:buNone/>
-            </a:pPr>
-            <a:r>
-              <a:rPr lang="en-US" b="1" dirty="0">
-                <a:latin typeface="Consolas" pitchFamily="49" charset="0"/>
-                <a:cs typeface="Consolas" pitchFamily="49" charset="0"/>
-              </a:rPr>
-              <a:t>  (</a:t>
-            </a:r>
-            <a:r>
-              <a:rPr lang="en-US" b="1" dirty="0" err="1">
-                <a:latin typeface="Consolas" pitchFamily="49" charset="0"/>
-                <a:cs typeface="Consolas" pitchFamily="49" charset="0"/>
-              </a:rPr>
-              <a:t>cond</a:t>
-            </a:r>
-            <a:endParaRPr lang="en-US" b="1" dirty="0">
-              <a:latin typeface="Consolas" pitchFamily="49" charset="0"/>
-              <a:cs typeface="Consolas" pitchFamily="49" charset="0"/>
-            </a:endParaRPr>
-          </a:p>
-          <a:p>
-            <a:pPr marL="0" indent="0">
-              <a:buNone/>
-            </a:pPr>
-            <a:r>
-              <a:rPr lang="en-US" b="1" dirty="0">
-                <a:latin typeface="Consolas" pitchFamily="49" charset="0"/>
-                <a:cs typeface="Consolas" pitchFamily="49" charset="0"/>
-              </a:rPr>
-              <a:t>    [(mouse=? </a:t>
-            </a:r>
-            <a:r>
-              <a:rPr lang="en-US" b="1" dirty="0" err="1">
-                <a:latin typeface="Consolas" pitchFamily="49" charset="0"/>
-                <a:cs typeface="Consolas" pitchFamily="49" charset="0"/>
-              </a:rPr>
-              <a:t>mev</a:t>
-            </a:r>
-            <a:r>
-              <a:rPr lang="en-US" b="1" dirty="0">
-                <a:latin typeface="Consolas" pitchFamily="49" charset="0"/>
-                <a:cs typeface="Consolas" pitchFamily="49" charset="0"/>
-              </a:rPr>
-              <a:t> "button-down") </a:t>
-            </a:r>
-            <a:endParaRPr lang="en-US" b="1" dirty="0" smtClean="0">
-              <a:latin typeface="Consolas" pitchFamily="49" charset="0"/>
-              <a:cs typeface="Consolas" pitchFamily="49" charset="0"/>
-            </a:endParaRPr>
-          </a:p>
-          <a:p>
-            <a:pPr marL="0" indent="0">
-              <a:buNone/>
-            </a:pPr>
-            <a:r>
-              <a:rPr lang="en-US" b="1" dirty="0">
-                <a:latin typeface="Consolas" pitchFamily="49" charset="0"/>
-                <a:cs typeface="Consolas" pitchFamily="49" charset="0"/>
-              </a:rPr>
-              <a:t> </a:t>
-            </a:r>
-            <a:r>
-              <a:rPr lang="en-US" b="1" dirty="0" smtClean="0">
-                <a:latin typeface="Consolas" pitchFamily="49" charset="0"/>
-                <a:cs typeface="Consolas" pitchFamily="49" charset="0"/>
-              </a:rPr>
-              <a:t>    (</a:t>
-            </a:r>
-            <a:r>
-              <a:rPr lang="en-US" b="1" dirty="0">
-                <a:latin typeface="Consolas" pitchFamily="49" charset="0"/>
-                <a:cs typeface="Consolas" pitchFamily="49" charset="0"/>
-              </a:rPr>
-              <a:t>world-after-button-down w mx my)]</a:t>
-            </a:r>
-          </a:p>
-          <a:p>
-            <a:pPr marL="0" indent="0">
-              <a:buNone/>
-            </a:pPr>
-            <a:r>
-              <a:rPr lang="en-US" b="1" dirty="0">
-                <a:latin typeface="Consolas" pitchFamily="49" charset="0"/>
-                <a:cs typeface="Consolas" pitchFamily="49" charset="0"/>
-              </a:rPr>
-              <a:t>    [(mouse=? </a:t>
-            </a:r>
-            <a:r>
-              <a:rPr lang="en-US" b="1" dirty="0" err="1">
-                <a:latin typeface="Consolas" pitchFamily="49" charset="0"/>
-                <a:cs typeface="Consolas" pitchFamily="49" charset="0"/>
-              </a:rPr>
-              <a:t>mev</a:t>
-            </a:r>
-            <a:r>
-              <a:rPr lang="en-US" b="1" dirty="0">
-                <a:latin typeface="Consolas" pitchFamily="49" charset="0"/>
-                <a:cs typeface="Consolas" pitchFamily="49" charset="0"/>
-              </a:rPr>
-              <a:t> "drag") </a:t>
-            </a:r>
-            <a:endParaRPr lang="en-US" b="1" dirty="0" smtClean="0">
-              <a:latin typeface="Consolas" pitchFamily="49" charset="0"/>
-              <a:cs typeface="Consolas" pitchFamily="49" charset="0"/>
-            </a:endParaRPr>
-          </a:p>
-          <a:p>
-            <a:pPr marL="0" indent="0">
-              <a:buNone/>
-            </a:pPr>
-            <a:r>
-              <a:rPr lang="en-US" b="1" dirty="0">
-                <a:latin typeface="Consolas" pitchFamily="49" charset="0"/>
-                <a:cs typeface="Consolas" pitchFamily="49" charset="0"/>
-              </a:rPr>
-              <a:t> </a:t>
-            </a:r>
-            <a:r>
-              <a:rPr lang="en-US" b="1" dirty="0" smtClean="0">
-                <a:latin typeface="Consolas" pitchFamily="49" charset="0"/>
-                <a:cs typeface="Consolas" pitchFamily="49" charset="0"/>
-              </a:rPr>
-              <a:t>    (</a:t>
-            </a:r>
-            <a:r>
-              <a:rPr lang="en-US" b="1" dirty="0">
-                <a:latin typeface="Consolas" pitchFamily="49" charset="0"/>
-                <a:cs typeface="Consolas" pitchFamily="49" charset="0"/>
-              </a:rPr>
-              <a:t>world-after-drag w mx my)]</a:t>
-            </a:r>
-          </a:p>
-          <a:p>
-            <a:pPr marL="0" indent="0">
-              <a:buNone/>
-            </a:pPr>
-            <a:r>
-              <a:rPr lang="en-US" b="1" dirty="0">
-                <a:latin typeface="Consolas" pitchFamily="49" charset="0"/>
-                <a:cs typeface="Consolas" pitchFamily="49" charset="0"/>
-              </a:rPr>
-              <a:t>    [(mouse=? </a:t>
-            </a:r>
-            <a:r>
-              <a:rPr lang="en-US" b="1" dirty="0" err="1">
-                <a:latin typeface="Consolas" pitchFamily="49" charset="0"/>
-                <a:cs typeface="Consolas" pitchFamily="49" charset="0"/>
-              </a:rPr>
-              <a:t>mev</a:t>
-            </a:r>
-            <a:r>
-              <a:rPr lang="en-US" b="1" dirty="0">
-                <a:latin typeface="Consolas" pitchFamily="49" charset="0"/>
-                <a:cs typeface="Consolas" pitchFamily="49" charset="0"/>
-              </a:rPr>
-              <a:t> "button-up</a:t>
-            </a:r>
-            <a:r>
-              <a:rPr lang="en-US" b="1" dirty="0" smtClean="0">
-                <a:latin typeface="Consolas" pitchFamily="49" charset="0"/>
-                <a:cs typeface="Consolas" pitchFamily="49" charset="0"/>
-              </a:rPr>
-              <a:t>")</a:t>
-            </a:r>
-          </a:p>
-          <a:p>
-            <a:pPr marL="0" indent="0">
-              <a:buNone/>
-            </a:pPr>
-            <a:r>
-              <a:rPr lang="en-US" b="1" dirty="0">
-                <a:latin typeface="Consolas" pitchFamily="49" charset="0"/>
-                <a:cs typeface="Consolas" pitchFamily="49" charset="0"/>
-              </a:rPr>
-              <a:t> </a:t>
-            </a:r>
-            <a:r>
-              <a:rPr lang="en-US" b="1" dirty="0" smtClean="0">
-                <a:latin typeface="Consolas" pitchFamily="49" charset="0"/>
-                <a:cs typeface="Consolas" pitchFamily="49" charset="0"/>
-              </a:rPr>
-              <a:t>    (world-after-button-up </a:t>
-            </a:r>
-            <a:r>
-              <a:rPr lang="en-US" b="1" dirty="0">
-                <a:latin typeface="Consolas" pitchFamily="49" charset="0"/>
-                <a:cs typeface="Consolas" pitchFamily="49" charset="0"/>
-              </a:rPr>
-              <a:t>w mx my)]</a:t>
+              <a:t>     (world-after-button-up w mx my)]</a:t>
             </a:r>
           </a:p>
           <a:p>
@@ -10299,13 +9703,6 @@
   <p:clrMapOvr>
     <a:masterClrMapping/>
   </p:clrMapOvr>
-  <p:timing>
-    <p:tnLst>
-      <p:par>
-        <p:cTn id="1" dur="indefinite" restart="never" nodeType="tmRoot"/>
-      </p:par>
-    </p:tnLst>
-  </p:timing>
 </p:sld>
 </file>
 
@@ -10342,10 +9739,9 @@
           <a:lstStyle/>
           <a:p>
             <a:r>
-              <a:rPr lang="en-US" dirty="0" smtClean="0"/>
+              <a:rPr lang="en-US" dirty="0"/>
               <a:t>How to test this function?</a:t>
             </a:r>
-            <a:endParaRPr lang="en-US" dirty="0"/>
           </a:p>
         </p:txBody>
       </p:sp>
@@ -10367,81 +9763,60 @@
           <a:lstStyle/>
           <a:p>
             <a:r>
-              <a:rPr lang="en-US" dirty="0" smtClean="0"/>
-              <a:t>3 </a:t>
-            </a:r>
-            <a:r>
-              <a:rPr lang="en-US" dirty="0"/>
-              <a:t>mouse events (+ a test for the else clause)</a:t>
-            </a:r>
-          </a:p>
-          <a:p>
-            <a:r>
-              <a:rPr lang="en-US" dirty="0" smtClean="0"/>
-              <a:t>cat </a:t>
-            </a:r>
-            <a:r>
-              <a:rPr lang="en-US" dirty="0"/>
-              <a:t>selected or </a:t>
-            </a:r>
-            <a:r>
-              <a:rPr lang="en-US" dirty="0" smtClean="0"/>
-              <a:t>unselected</a:t>
+              <a:rPr lang="en-US" dirty="0"/>
+              <a:t>3 mouse events (+ a test for the else clause)</a:t>
+            </a:r>
+          </a:p>
+          <a:p>
+            <a:r>
+              <a:rPr lang="en-US" dirty="0"/>
+              <a:t>cat selected or unselected</a:t>
             </a:r>
           </a:p>
           <a:p>
             <a:pPr lvl="1"/>
             <a:r>
-              <a:rPr lang="en-US" dirty="0" smtClean="0"/>
+              <a:rPr lang="en-US" dirty="0"/>
               <a:t>mouse works the same way whether the cat is paused or not.  </a:t>
             </a:r>
           </a:p>
           <a:p>
             <a:r>
-              <a:rPr lang="en-US" dirty="0" smtClean="0"/>
-              <a:t>event </a:t>
-            </a:r>
-            <a:r>
-              <a:rPr lang="en-US" dirty="0"/>
-              <a:t>inside cat or not</a:t>
-            </a:r>
-            <a:r>
-              <a:rPr lang="en-US" dirty="0" smtClean="0"/>
-              <a:t>.</a:t>
-            </a:r>
-          </a:p>
-          <a:p>
-            <a:r>
-              <a:rPr lang="en-US" dirty="0" smtClean="0"/>
+              <a:rPr lang="en-US" dirty="0"/>
+              <a:t>event inside cat or not.</a:t>
+            </a:r>
+          </a:p>
+          <a:p>
+            <a:r>
+              <a:rPr lang="en-US" dirty="0"/>
               <a:t>3 x 2 x 2 = 12 tests</a:t>
             </a:r>
           </a:p>
           <a:p>
             <a:r>
-              <a:rPr lang="en-US" dirty="0" smtClean="0"/>
+              <a:rPr lang="en-US" dirty="0"/>
               <a:t>plus test for else clause</a:t>
             </a:r>
           </a:p>
           <a:p>
             <a:r>
-              <a:rPr lang="en-US" dirty="0" smtClean="0"/>
+              <a:rPr lang="en-US" dirty="0"/>
               <a:t>plus: cat remains paused or </a:t>
             </a:r>
             <a:r>
-              <a:rPr lang="en-US" dirty="0" err="1" smtClean="0"/>
+              <a:rPr lang="en-US" dirty="0" err="1"/>
               <a:t>unpaused</a:t>
             </a:r>
             <a:r>
-              <a:rPr lang="en-US" dirty="0" smtClean="0"/>
+              <a:rPr lang="en-US" dirty="0"/>
               <a:t> across selection.</a:t>
             </a:r>
           </a:p>
           <a:p>
             <a:r>
-              <a:rPr lang="en-US" dirty="0" smtClean="0"/>
+              <a:rPr lang="en-US" dirty="0"/>
               <a:t>Demo: draggable-cat.rkt</a:t>
             </a:r>
-            <a:endParaRPr lang="en-US" dirty="0"/>
           </a:p>
           <a:p>
             <a:endParaRPr lang="en-US" dirty="0"/>
@@ -10481,13 +9856,6 @@
   <p:clrMapOvr>
     <a:masterClrMapping/>
   </p:clrMapOvr>
-  <p:timing>
-    <p:tnLst>
-      <p:par>
-        <p:cTn id="1" dur="indefinite" restart="never" nodeType="tmRoot"/>
-      </p:par>
-    </p:tnLst>
-  </p:timing>
 </p:sld>
 </file>
 
@@ -10524,15 +9892,15 @@
           <a:lstStyle/>
           <a:p>
             <a:r>
-              <a:rPr lang="en-US" dirty="0" err="1" smtClean="0"/>
+              <a:rPr lang="en-US" dirty="0" err="1"/>
               <a:t>Draggable</a:t>
             </a:r>
             <a:r>
-              <a:rPr lang="en-US" dirty="0" smtClean="0"/>
+              <a:rPr lang="en-US" dirty="0"/>
               <a:t>-cat </a:t>
             </a:r>
             <a:r>
-              <a:rPr lang="en-US" dirty="0" err="1" smtClean="0"/>
+              <a:rPr lang="en-US" dirty="0" err="1"/>
               <a:t>readthrough</a:t>
             </a:r>
             <a:endParaRPr lang="en-US" dirty="0"/>
@@ -10594,22 +9962,9 @@
           <a:lstStyle/>
           <a:p>
             <a:r>
-              <a:rPr lang="en-US" dirty="0" smtClean="0"/>
-              <a:t>Remember, in the time since this video was recorded, </a:t>
-            </a:r>
-            <a:r>
-              <a:rPr lang="en-US" dirty="0" err="1" smtClean="0"/>
-              <a:t>w’ve</a:t>
-            </a:r>
-            <a:r>
-              <a:rPr lang="en-US" dirty="0" smtClean="0"/>
-              <a:t> changed many of the details.  Look carefully </a:t>
-            </a:r>
-            <a:r>
-              <a:rPr lang="en-US" dirty="0" smtClean="0"/>
-              <a:t>at the file in the Examples folder.  That’s the one that your code should resemble.</a:t>
-            </a:r>
-            <a:endParaRPr lang="en-US" dirty="0"/>
+              <a:rPr lang="en-US" dirty="0"/>
+              <a:t>Remember, in the time since this video was recorded, we’ve changed many of the details.  Look carefully at the file in the Examples folder.  That’s the one that your code should resemble.</a:t>
+            </a:r>
           </a:p>
         </p:txBody>
       </p:sp>
@@ -10636,7 +9991,7 @@
           <a:lstStyle/>
           <a:p>
             <a:r>
-              <a:rPr lang="en-US" dirty="0" smtClean="0">
+              <a:rPr lang="en-US" dirty="0">
                 <a:hlinkClick r:id="rId4"/>
               </a:rPr>
               <a:t>YouTube link</a:t>
@@ -10794,10 +10149,9 @@
           <a:lstStyle/>
           <a:p>
             <a:r>
-              <a:rPr lang="en-US" dirty="0" smtClean="0"/>
+              <a:rPr lang="en-US" dirty="0"/>
               <a:t>The Iterative Design Recipe</a:t>
             </a:r>
-            <a:endParaRPr lang="en-US" dirty="0"/>
           </a:p>
         </p:txBody>
       </p:sp>
@@ -10817,22 +10171,21 @@
           <a:lstStyle/>
           <a:p>
             <a:r>
-              <a:rPr lang="en-US" dirty="0" smtClean="0"/>
+              <a:rPr lang="en-US" dirty="0"/>
               <a:t>We started with a simple system, and we added some new features to it.</a:t>
             </a:r>
           </a:p>
           <a:p>
             <a:r>
-              <a:rPr lang="en-US" dirty="0" smtClean="0"/>
+              <a:rPr lang="en-US" dirty="0"/>
               <a:t>In doing this, we were following a recipe.</a:t>
             </a:r>
           </a:p>
           <a:p>
             <a:r>
-              <a:rPr lang="en-US" dirty="0" smtClean="0"/>
+              <a:rPr lang="en-US" dirty="0"/>
               <a:t>We call this the “iterative design recipe” because it tells us how to build a system by iteratively adding more complex features.</a:t>
             </a:r>
-            <a:endParaRPr lang="en-US" dirty="0"/>
           </a:p>
         </p:txBody>
       </p:sp>
@@ -10864,10 +10217,9 @@
           <a:lstStyle/>
           <a:p>
             <a:r>
-              <a:rPr lang="en-US" dirty="0" smtClean="0"/>
+              <a:rPr lang="en-US" dirty="0"/>
               <a:t>“iteratively” means “repeatedly” or “in stages”</a:t>
             </a:r>
-            <a:endParaRPr lang="en-US" dirty="0"/>
           </a:p>
         </p:txBody>
       </p:sp>
@@ -10942,13 +10294,6 @@
   <p:clrMapOvr>
     <a:masterClrMapping/>
   </p:clrMapOvr>
-  <p:timing>
-    <p:tnLst>
-      <p:par>
-        <p:cTn id="1" dur="indefinite" restart="never" nodeType="tmRoot"/>
-      </p:par>
-    </p:tnLst>
-  </p:timing>
 </p:sld>
 </file>
 
@@ -10985,10 +10330,9 @@
           <a:lstStyle/>
           <a:p>
             <a:r>
-              <a:rPr lang="en-US" dirty="0" smtClean="0"/>
+              <a:rPr lang="en-US" dirty="0"/>
               <a:t>The Iterative Design Recipe</a:t>
             </a:r>
-            <a:endParaRPr lang="en-US" dirty="0"/>
           </a:p>
         </p:txBody>
       </p:sp>
@@ -11018,7 +10362,13 @@
                 <a:tableStyleId>{5C22544A-7EE6-4342-B048-85BDC9FD1C3A}</a:tableStyleId>
               </a:tblPr>
               <a:tblGrid>
-                <a:gridCol w="8229600"/>
+                <a:gridCol w="8229600">
+                  <a:extLst>
+                    <a:ext uri="{9D8B030D-6E8A-4147-A177-3AD203B41FA5}">
+                      <a16:colId xmlns:a16="http://schemas.microsoft.com/office/drawing/2014/main" val="20000"/>
+                    </a:ext>
+                  </a:extLst>
+                </a:gridCol>
               </a:tblGrid>
               <a:tr h="370840">
                 <a:tc>
@@ -11027,14 +10377,18 @@
                     <a:lstStyle/>
                     <a:p>
                       <a:r>
-                        <a:rPr lang="en-US" sz="3200" dirty="0" smtClean="0"/>
+                        <a:rPr lang="en-US" sz="3200" dirty="0"/>
                         <a:t>Adding a New Feature to an Existing Program</a:t>
                       </a:r>
-                      <a:endParaRPr lang="en-US" sz="3200" dirty="0"/>
                     </a:p>
                   </a:txBody>
                   <a:tcPr/>
                 </a:tc>
+                <a:extLst>
+                  <a:ext uri="{0D108BD9-81ED-4DB2-BD59-A6C34878D82A}">
+                    <a16:rowId xmlns:a16="http://schemas.microsoft.com/office/drawing/2014/main" val="10000"/>
+                  </a:ext>
+                </a:extLst>
               </a:tr>
               <a:tr h="370840">
                 <a:tc>
@@ -11046,17 +10400,22 @@
                         <a:buNone/>
                       </a:pPr>
                       <a:r>
-                        <a:rPr lang="en-US" sz="3200" dirty="0" smtClean="0"/>
+                        <a:rPr lang="en-US" sz="3200" dirty="0"/>
                         <a:t>1. Perform</a:t>
                       </a:r>
                       <a:r>
-                        <a:rPr lang="en-US" sz="3200" baseline="0" dirty="0" smtClean="0"/>
+                        <a:rPr lang="en-US" sz="3200" baseline="0" dirty="0"/>
                         <a:t> information analysis for new feature</a:t>
                       </a:r>
                     </a:p>
                   </a:txBody>
                   <a:tcPr/>
                 </a:tc>
+                <a:extLst>
+                  <a:ext uri="{0D108BD9-81ED-4DB2-BD59-A6C34878D82A}">
+                    <a16:rowId xmlns:a16="http://schemas.microsoft.com/office/drawing/2014/main" val="10001"/>
+                  </a:ext>
+                </a:extLst>
               </a:tr>
               <a:tr h="370840">
                 <a:tc>
@@ -11065,11 +10424,11 @@
                     <a:lstStyle/>
                     <a:p>
                       <a:r>
-                        <a:rPr lang="en-US" sz="3200" dirty="0" smtClean="0"/>
+                        <a:rPr lang="en-US" sz="3200" dirty="0"/>
                         <a:t>2. Modify data definitions</a:t>
                       </a:r>
                       <a:r>
-                        <a:rPr lang="en-US" sz="3200" baseline="0" dirty="0" smtClean="0"/>
+                        <a:rPr lang="en-US" sz="3200" baseline="0" dirty="0"/>
                         <a:t> as needed</a:t>
                       </a:r>
                       <a:endParaRPr lang="en-US" sz="3200" dirty="0"/>
@@ -11077,6 +10436,11 @@
                   </a:txBody>
                   <a:tcPr/>
                 </a:tc>
+                <a:extLst>
+                  <a:ext uri="{0D108BD9-81ED-4DB2-BD59-A6C34878D82A}">
+                    <a16:rowId xmlns:a16="http://schemas.microsoft.com/office/drawing/2014/main" val="10002"/>
+                  </a:ext>
+                </a:extLst>
               </a:tr>
               <a:tr h="370840">
                 <a:tc>
@@ -11085,17 +10449,22 @@
                     <a:lstStyle/>
                     <a:p>
                       <a:r>
-                        <a:rPr lang="en-US" sz="3200" dirty="0" smtClean="0"/>
+                        <a:rPr lang="en-US" sz="3200" dirty="0"/>
                         <a:t>3. Update existing functions to work with</a:t>
                       </a:r>
                       <a:r>
-                        <a:rPr lang="en-US" sz="3200" baseline="0" dirty="0" smtClean="0"/>
+                        <a:rPr lang="en-US" sz="3200" baseline="0" dirty="0"/>
                         <a:t> new data definitions</a:t>
                       </a:r>
                     </a:p>
                   </a:txBody>
                   <a:tcPr/>
                 </a:tc>
+                <a:extLst>
+                  <a:ext uri="{0D108BD9-81ED-4DB2-BD59-A6C34878D82A}">
+                    <a16:rowId xmlns:a16="http://schemas.microsoft.com/office/drawing/2014/main" val="10003"/>
+                  </a:ext>
+                </a:extLst>
               </a:tr>
               <a:tr h="370840">
                 <a:tc>
@@ -11104,22 +10473,26 @@
                     <a:lstStyle/>
                     <a:p>
                       <a:r>
-                        <a:rPr lang="en-US" sz="3200" dirty="0" smtClean="0"/>
+                        <a:rPr lang="en-US" sz="3200" dirty="0"/>
                         <a:t>4. Write </a:t>
                       </a:r>
                       <a:r>
-                        <a:rPr lang="en-US" sz="3200" dirty="0" err="1" smtClean="0"/>
+                        <a:rPr lang="en-US" sz="3200" dirty="0" err="1"/>
                         <a:t>wishlist</a:t>
                       </a:r>
                       <a:r>
-                        <a:rPr lang="en-US" sz="3200" dirty="0" smtClean="0"/>
+                        <a:rPr lang="en-US" sz="3200" dirty="0"/>
                         <a:t> of functions for new feature</a:t>
                       </a:r>
-                      <a:endParaRPr lang="en-US" sz="3200" dirty="0"/>
                     </a:p>
                   </a:txBody>
                   <a:tcPr/>
                 </a:tc>
+                <a:extLst>
+                  <a:ext uri="{0D108BD9-81ED-4DB2-BD59-A6C34878D82A}">
+                    <a16:rowId xmlns:a16="http://schemas.microsoft.com/office/drawing/2014/main" val="10004"/>
+                  </a:ext>
+                </a:extLst>
               </a:tr>
               <a:tr h="370840">
                 <a:tc>
@@ -11128,17 +10501,22 @@
                     <a:lstStyle/>
                     <a:p>
                       <a:r>
-                        <a:rPr lang="en-US" sz="3200" dirty="0" smtClean="0"/>
+                        <a:rPr lang="en-US" sz="3200" dirty="0"/>
                         <a:t>5. Design new functions following the Design</a:t>
                       </a:r>
                       <a:r>
-                        <a:rPr lang="en-US" sz="3200" baseline="0" dirty="0" smtClean="0"/>
+                        <a:rPr lang="en-US" sz="3200" baseline="0" dirty="0"/>
                         <a:t> Recipe</a:t>
                       </a:r>
                     </a:p>
                   </a:txBody>
                   <a:tcPr/>
                 </a:tc>
+                <a:extLst>
+                  <a:ext uri="{0D108BD9-81ED-4DB2-BD59-A6C34878D82A}">
+                    <a16:rowId xmlns:a16="http://schemas.microsoft.com/office/drawing/2014/main" val="10005"/>
+                  </a:ext>
+                </a:extLst>
               </a:tr>
               <a:tr h="370840">
                 <a:tc>
@@ -11147,13 +10525,18 @@
                     <a:lstStyle/>
                     <a:p>
                       <a:r>
-                        <a:rPr lang="en-US" sz="3200" baseline="0" dirty="0" smtClean="0"/>
+                        <a:rPr lang="en-US" sz="3200" baseline="0" dirty="0"/>
                         <a:t>6. Repeat for the next new feature</a:t>
                       </a:r>
                     </a:p>
                   </a:txBody>
                   <a:tcPr/>
                 </a:tc>
+                <a:extLst>
+                  <a:ext uri="{0D108BD9-81ED-4DB2-BD59-A6C34878D82A}">
+                    <a16:rowId xmlns:a16="http://schemas.microsoft.com/office/drawing/2014/main" val="10006"/>
+                  </a:ext>
+                </a:extLst>
               </a:tr>
             </a:tbl>
           </a:graphicData>
@@ -11192,13 +10575,6 @@
   <p:clrMapOvr>
     <a:masterClrMapping/>
   </p:clrMapOvr>
-  <p:timing>
-    <p:tnLst>
-      <p:par>
-        <p:cTn id="1" dur="indefinite" restart="never" nodeType="tmRoot"/>
-      </p:par>
-    </p:tnLst>
-  </p:timing>
 </p:sld>
 </file>
 
@@ -11235,10 +10611,9 @@
           <a:lstStyle/>
           <a:p>
             <a:r>
-              <a:rPr lang="en-US" dirty="0" smtClean="0"/>
+              <a:rPr lang="en-US" dirty="0"/>
               <a:t>Summary</a:t>
             </a:r>
-            <a:endParaRPr lang="en-US" dirty="0"/>
           </a:p>
         </p:txBody>
       </p:sp>
@@ -11258,24 +10633,23 @@
           <a:lstStyle/>
           <a:p>
             <a:r>
-              <a:rPr lang="en-US" dirty="0" smtClean="0"/>
+              <a:rPr lang="en-US" dirty="0"/>
               <a:t>In this lesson, you had the opportunity to</a:t>
             </a:r>
           </a:p>
           <a:p>
             <a:pPr lvl="1"/>
             <a:r>
-              <a:rPr lang="en-US" dirty="0" smtClean="0"/>
+              <a:rPr lang="en-US" dirty="0"/>
               <a:t>create a Universe program that responds to mouse events</a:t>
             </a:r>
           </a:p>
           <a:p>
             <a:pPr lvl="1"/>
             <a:r>
-              <a:rPr lang="en-US" dirty="0" smtClean="0"/>
+              <a:rPr lang="en-US" dirty="0"/>
               <a:t>use the recipe for adding functionality to a working program (the Iterative Design Recipe)</a:t>
             </a:r>
-            <a:endParaRPr lang="en-US" dirty="0"/>
           </a:p>
         </p:txBody>
       </p:sp>
@@ -11312,13 +10686,6 @@
   <p:clrMapOvr>
     <a:masterClrMapping/>
   </p:clrMapOvr>
-  <p:timing>
-    <p:tnLst>
-      <p:par>
-        <p:cTn id="1" dur="indefinite" restart="never" nodeType="tmRoot"/>
-      </p:par>
-    </p:tnLst>
-  </p:timing>
 </p:sld>
 </file>
 
@@ -11355,10 +10722,9 @@
           <a:lstStyle/>
           <a:p>
             <a:r>
-              <a:rPr lang="en-US" dirty="0" smtClean="0"/>
+              <a:rPr lang="en-US" dirty="0"/>
               <a:t>Next Steps</a:t>
             </a:r>
-            <a:endParaRPr lang="en-US" dirty="0"/>
           </a:p>
         </p:txBody>
       </p:sp>
@@ -11378,16 +10744,15 @@
           <a:lstStyle/>
           <a:p>
             <a:r>
-              <a:rPr lang="en-US" dirty="0" smtClean="0"/>
+              <a:rPr lang="en-US" dirty="0"/>
               <a:t>If you have questions about this lesson, ask them on the Discussion Board</a:t>
             </a:r>
           </a:p>
           <a:p>
             <a:r>
-              <a:rPr lang="en-US" dirty="0" smtClean="0"/>
+              <a:rPr lang="en-US" dirty="0"/>
               <a:t>Go on to the next lesson</a:t>
             </a:r>
-            <a:endParaRPr lang="en-US" dirty="0"/>
           </a:p>
         </p:txBody>
       </p:sp>
@@ -11424,13 +10789,6 @@
   <p:clrMapOvr>
     <a:masterClrMapping/>
   </p:clrMapOvr>
-  <p:timing>
-    <p:tnLst>
-      <p:par>
-        <p:cTn id="1" dur="indefinite" restart="never" nodeType="tmRoot"/>
-      </p:par>
-    </p:tnLst>
-  </p:timing>
 </p:sld>
 </file>
 
@@ -11467,10 +10825,9 @@
           <a:lstStyle/>
           <a:p>
             <a:r>
-              <a:rPr lang="en-US" dirty="0" smtClean="0"/>
+              <a:rPr lang="en-US" dirty="0"/>
               <a:t>Learning Objectives</a:t>
             </a:r>
-            <a:endParaRPr lang="en-US" dirty="0"/>
           </a:p>
         </p:txBody>
       </p:sp>
@@ -11491,26 +10848,14 @@
           <a:p>
             <a:r>
               <a:rPr lang="en-US" dirty="0"/>
-              <a:t>At the end of this lesson </a:t>
-            </a:r>
-            <a:r>
-              <a:rPr lang="en-US" dirty="0" smtClean="0"/>
-              <a:t>you should </a:t>
-            </a:r>
-            <a:r>
-              <a:rPr lang="en-US" dirty="0"/>
-              <a:t>be able to:</a:t>
+              <a:t>At the end of this lesson you should be able to:</a:t>
             </a:r>
           </a:p>
           <a:p>
             <a:pPr lvl="1"/>
             <a:r>
-              <a:rPr lang="en-US" dirty="0" smtClean="0"/>
-              <a:t>design </a:t>
-            </a:r>
-            <a:r>
-              <a:rPr lang="en-US" dirty="0"/>
-              <a:t>a Universe program that responds to mouse events</a:t>
+              <a:rPr lang="en-US" dirty="0"/>
+              <a:t>design a Universe program that responds to mouse events</a:t>
             </a:r>
           </a:p>
           <a:p>
@@ -11558,13 +10903,6 @@
   <p:clrMapOvr>
     <a:masterClrMapping/>
   </p:clrMapOvr>
-  <p:timing>
-    <p:tnLst>
-      <p:par>
-        <p:cTn id="1" dur="indefinite" restart="never" nodeType="tmRoot"/>
-      </p:par>
-    </p:tnLst>
-  </p:timing>
 </p:sld>
 </file>
 
@@ -11601,14 +10939,13 @@
           <a:lstStyle/>
           <a:p>
             <a:r>
-              <a:rPr lang="en-US" dirty="0" err="1" smtClean="0"/>
+              <a:rPr lang="en-US" dirty="0" err="1"/>
               <a:t>draggable</a:t>
             </a:r>
             <a:r>
-              <a:rPr lang="en-US" dirty="0" smtClean="0"/>
+              <a:rPr lang="en-US" dirty="0"/>
               <a:t>-cat: Requirements</a:t>
             </a:r>
-            <a:endParaRPr lang="en-US" dirty="0"/>
           </a:p>
         </p:txBody>
       </p:sp>
@@ -11630,50 +10967,38 @@
           <a:lstStyle/>
           <a:p>
             <a:r>
-              <a:rPr lang="en-US" dirty="0" smtClean="0"/>
-              <a:t>Like </a:t>
-            </a:r>
-            <a:r>
-              <a:rPr lang="en-US" dirty="0"/>
-              <a:t>falling cat, but user can drag the cat with the mouse.</a:t>
-            </a:r>
-          </a:p>
-          <a:p>
-            <a:r>
-              <a:rPr lang="en-US" dirty="0" smtClean="0"/>
-              <a:t>button-down </a:t>
-            </a:r>
-            <a:r>
-              <a:rPr lang="en-US" dirty="0"/>
-              <a:t>to select, drag to move, button-up to release</a:t>
-            </a:r>
-            <a:r>
-              <a:rPr lang="en-US" dirty="0" smtClean="0"/>
-              <a:t>.</a:t>
-            </a:r>
-          </a:p>
-          <a:p>
-            <a:r>
-              <a:rPr lang="en-US" dirty="0" smtClean="0"/>
+              <a:rPr lang="en-US" dirty="0"/>
+              <a:t>Like falling cat, but user can drag the cat with the mouse.</a:t>
+            </a:r>
+          </a:p>
+          <a:p>
+            <a:r>
+              <a:rPr lang="en-US" dirty="0"/>
+              <a:t>button-down to select, drag to move, button-up to release.</a:t>
+            </a:r>
+          </a:p>
+          <a:p>
+            <a:r>
+              <a:rPr lang="en-US" dirty="0"/>
               <a:t>A selected cat doesn't fall.  When unselected, cat resumes its previous </a:t>
             </a:r>
             <a:r>
-              <a:rPr lang="en-US" dirty="0" err="1" smtClean="0"/>
+              <a:rPr lang="en-US" dirty="0" err="1"/>
               <a:t>pausedness</a:t>
             </a:r>
-            <a:endParaRPr lang="en-US" dirty="0" smtClean="0"/>
+            <a:endParaRPr lang="en-US" dirty="0"/>
           </a:p>
           <a:p>
             <a:pPr lvl="1"/>
             <a:r>
-              <a:rPr lang="en-US" dirty="0" smtClean="0"/>
+              <a:rPr lang="en-US" dirty="0"/>
               <a:t>if it was falling, it will continue to fall when released</a:t>
             </a:r>
           </a:p>
           <a:p>
             <a:pPr lvl="1"/>
             <a:r>
-              <a:rPr lang="en-US" dirty="0" smtClean="0"/>
+              <a:rPr lang="en-US" dirty="0"/>
               <a:t>if it was paused, it will remain paused when released</a:t>
             </a:r>
           </a:p>
@@ -11715,13 +11040,6 @@
   <p:clrMapOvr>
     <a:masterClrMapping/>
   </p:clrMapOvr>
-  <p:timing>
-    <p:tnLst>
-      <p:par>
-        <p:cTn id="1" dur="indefinite" restart="never" nodeType="tmRoot"/>
-      </p:par>
-    </p:tnLst>
-  </p:timing>
 </p:sld>
 </file>
 
@@ -11758,18 +11076,17 @@
           <a:lstStyle/>
           <a:p>
             <a:r>
-              <a:rPr lang="en-US" dirty="0" smtClean="0"/>
+              <a:rPr lang="en-US" dirty="0"/>
               <a:t>Video: </a:t>
             </a:r>
             <a:r>
-              <a:rPr lang="en-US" dirty="0" err="1" smtClean="0"/>
+              <a:rPr lang="en-US" dirty="0" err="1"/>
               <a:t>draggable</a:t>
             </a:r>
             <a:r>
-              <a:rPr lang="en-US" dirty="0" smtClean="0"/>
+              <a:rPr lang="en-US" dirty="0"/>
               <a:t>-cat demo</a:t>
             </a:r>
-            <a:endParaRPr lang="en-US" dirty="0"/>
           </a:p>
         </p:txBody>
       </p:sp>
@@ -11823,7 +11140,7 @@
           <a:lstStyle/>
           <a:p>
             <a:r>
-              <a:rPr lang="en-US" dirty="0" smtClean="0">
+              <a:rPr lang="en-US" dirty="0">
                 <a:hlinkClick r:id="rId4"/>
               </a:rPr>
               <a:t>YouTube link</a:t>
@@ -11981,10 +11298,9 @@
           <a:lstStyle/>
           <a:p>
             <a:r>
-              <a:rPr lang="en-US" dirty="0" smtClean="0"/>
+              <a:rPr lang="en-US" dirty="0"/>
               <a:t>in-cat? relies on Bounding Box</a:t>
             </a:r>
-            <a:endParaRPr lang="en-US" dirty="0"/>
           </a:p>
         </p:txBody>
       </p:sp>
@@ -12148,16 +11464,12 @@
           <a:lstStyle/>
           <a:p>
             <a:r>
-              <a:rPr lang="en-US" b="1" dirty="0" smtClean="0">
+              <a:rPr lang="en-US" b="1" dirty="0">
                 <a:latin typeface="Consolas" pitchFamily="49" charset="0"/>
                 <a:cs typeface="Consolas" pitchFamily="49" charset="0"/>
               </a:rPr>
               <a:t>w = (image-width CAT-IMAGE)</a:t>
             </a:r>
-            <a:endParaRPr lang="en-US" b="1" dirty="0">
-              <a:latin typeface="Consolas" pitchFamily="49" charset="0"/>
-              <a:cs typeface="Consolas" pitchFamily="49" charset="0"/>
-            </a:endParaRPr>
           </a:p>
         </p:txBody>
       </p:sp>
@@ -12293,7 +11605,7 @@
           <a:lstStyle/>
           <a:p>
             <a:r>
-              <a:rPr lang="en-US" b="1" dirty="0" smtClean="0">
+              <a:rPr lang="en-US" b="1" dirty="0">
                 <a:latin typeface="Consolas" pitchFamily="49" charset="0"/>
                 <a:cs typeface="Consolas" pitchFamily="49" charset="0"/>
               </a:rPr>
@@ -12302,16 +11614,12 @@
           </a:p>
           <a:p>
             <a:r>
-              <a:rPr lang="en-US" b="1" dirty="0" smtClean="0">
+              <a:rPr lang="en-US" b="1" dirty="0">
                 <a:latin typeface="Consolas" pitchFamily="49" charset="0"/>
                 <a:cs typeface="Consolas" pitchFamily="49" charset="0"/>
               </a:rPr>
               <a:t> (image-height CAT-IMAGE)</a:t>
             </a:r>
-            <a:endParaRPr lang="en-US" b="1" dirty="0">
-              <a:latin typeface="Consolas" pitchFamily="49" charset="0"/>
-              <a:cs typeface="Consolas" pitchFamily="49" charset="0"/>
-            </a:endParaRPr>
           </a:p>
         </p:txBody>
       </p:sp>
@@ -12387,14 +11695,11 @@
           <a:lstStyle/>
           <a:p>
             <a:r>
-              <a:rPr lang="en-US" dirty="0" smtClean="0">
+              <a:rPr lang="en-US" dirty="0">
                 <a:cs typeface="Consolas" pitchFamily="49" charset="0"/>
               </a:rPr>
               <a:t>(x0,y0)</a:t>
             </a:r>
-            <a:endParaRPr lang="en-US" dirty="0">
-              <a:cs typeface="Consolas" pitchFamily="49" charset="0"/>
-            </a:endParaRPr>
           </a:p>
         </p:txBody>
       </p:sp>
@@ -12517,35 +11822,35 @@
           <a:lstStyle/>
           <a:p>
             <a:r>
-              <a:rPr lang="en-US" dirty="0" smtClean="0"/>
+              <a:rPr lang="en-US" dirty="0"/>
               <a:t>(</a:t>
             </a:r>
             <a:r>
-              <a:rPr lang="en-US" dirty="0" err="1" smtClean="0"/>
+              <a:rPr lang="en-US" dirty="0" err="1"/>
               <a:t>x,y</a:t>
             </a:r>
             <a:r>
-              <a:rPr lang="en-US" dirty="0" smtClean="0"/>
+              <a:rPr lang="en-US" dirty="0"/>
               <a:t>) is inside the rectangle </a:t>
             </a:r>
             <a:r>
-              <a:rPr lang="en-US" dirty="0" err="1" smtClean="0"/>
+              <a:rPr lang="en-US" dirty="0" err="1"/>
               <a:t>iff</a:t>
             </a:r>
-            <a:endParaRPr lang="en-US" dirty="0" smtClean="0"/>
-          </a:p>
-          <a:p>
-            <a:r>
-              <a:rPr lang="en-US" dirty="0" smtClean="0"/>
+            <a:endParaRPr lang="en-US" dirty="0"/>
+          </a:p>
+          <a:p>
+            <a:r>
+              <a:rPr lang="en-US" dirty="0"/>
               <a:t>        (x0-w/2) &lt;= x &lt;= (x0 + w/2)</a:t>
             </a:r>
           </a:p>
           <a:p>
             <a:r>
-              <a:rPr lang="en-US" dirty="0" smtClean="0"/>
+              <a:rPr lang="en-US" dirty="0"/>
               <a:t>and (y0-h/2)  &lt;= y &lt;= (y0+h/2)</a:t>
             </a:r>
-            <a:endParaRPr lang="en-US" b="1" dirty="0" smtClean="0">
+            <a:endParaRPr lang="en-US" b="1" dirty="0">
               <a:latin typeface="Consolas" pitchFamily="49" charset="0"/>
               <a:cs typeface="Consolas" pitchFamily="49" charset="0"/>
             </a:endParaRPr>
@@ -12578,10 +11883,9 @@
           <a:lstStyle/>
           <a:p>
             <a:r>
-              <a:rPr lang="en-US" dirty="0" smtClean="0"/>
+              <a:rPr lang="en-US" dirty="0"/>
               <a:t>y = y0-h/2</a:t>
             </a:r>
-            <a:endParaRPr lang="en-US" dirty="0"/>
           </a:p>
         </p:txBody>
       </p:sp>
@@ -12608,10 +11912,9 @@
           <a:lstStyle/>
           <a:p>
             <a:r>
-              <a:rPr lang="en-US" dirty="0" smtClean="0"/>
+              <a:rPr lang="en-US" dirty="0"/>
               <a:t>y = y0+h/2</a:t>
             </a:r>
-            <a:endParaRPr lang="en-US" dirty="0"/>
           </a:p>
         </p:txBody>
       </p:sp>
@@ -12638,10 +11941,9 @@
           <a:lstStyle/>
           <a:p>
             <a:r>
-              <a:rPr lang="en-US" dirty="0" smtClean="0"/>
+              <a:rPr lang="en-US" dirty="0"/>
               <a:t>x = x0-w/2</a:t>
             </a:r>
-            <a:endParaRPr lang="en-US" dirty="0"/>
           </a:p>
         </p:txBody>
       </p:sp>
@@ -12668,10 +11970,9 @@
           <a:lstStyle/>
           <a:p>
             <a:r>
-              <a:rPr lang="en-US" dirty="0" smtClean="0"/>
+              <a:rPr lang="en-US" dirty="0"/>
               <a:t>x = x0+w/2</a:t>
             </a:r>
-            <a:endParaRPr lang="en-US" dirty="0"/>
           </a:p>
         </p:txBody>
       </p:sp>
@@ -12801,13 +12102,6 @@
   <p:clrMapOvr>
     <a:masterClrMapping/>
   </p:clrMapOvr>
-  <p:timing>
-    <p:tnLst>
-      <p:par>
-        <p:cTn id="1" dur="indefinite" restart="never" nodeType="tmRoot"/>
-      </p:par>
-    </p:tnLst>
-  </p:timing>
 </p:sld>
 </file>
 
@@ -12844,66 +12138,60 @@
           <a:lstStyle/>
           <a:p>
             <a:r>
-              <a:rPr lang="en-US" dirty="0" smtClean="0"/>
+              <a:rPr lang="en-US" dirty="0"/>
               <a:t>Information Analysis</a:t>
             </a:r>
+          </a:p>
+        </p:txBody>
+      </p:sp>
+      <p:sp>
+        <p:nvSpPr>
+          <p:cNvPr id="3" name="Content Placeholder 2"/>
+          <p:cNvSpPr>
+            <a:spLocks noGrp="1"/>
+          </p:cNvSpPr>
+          <p:nvPr>
+            <p:ph idx="1"/>
+          </p:nvPr>
+        </p:nvSpPr>
+        <p:spPr/>
+        <p:txBody>
+          <a:bodyPr/>
+          <a:lstStyle/>
+          <a:p>
+            <a:r>
+              <a:rPr lang="en-US" dirty="0"/>
+              <a:t>What are the possible behaviors of the cat?</a:t>
+            </a:r>
+          </a:p>
+          <a:p>
+            <a:pPr lvl="1"/>
+            <a:r>
+              <a:rPr lang="en-US" dirty="0"/>
+              <a:t>as it falls?</a:t>
+            </a:r>
+          </a:p>
+          <a:p>
+            <a:pPr lvl="1"/>
+            <a:r>
+              <a:rPr lang="en-US" dirty="0"/>
+              <a:t>as it is dragged?</a:t>
+            </a:r>
+          </a:p>
+          <a:p>
+            <a:r>
+              <a:rPr lang="en-US" dirty="0"/>
+              <a:t>If we can answer these questions, we can determine what information needs to be represented for the cat.</a:t>
+            </a:r>
+          </a:p>
+          <a:p>
+            <a:r>
+              <a:rPr lang="en-US" dirty="0"/>
+              <a:t>Let's write down the answers in graphical form.</a:t>
+            </a:r>
+          </a:p>
+          <a:p>
             <a:endParaRPr lang="en-US" dirty="0"/>
-          </a:p>
-        </p:txBody>
-      </p:sp>
-      <p:sp>
-        <p:nvSpPr>
-          <p:cNvPr id="3" name="Content Placeholder 2"/>
-          <p:cNvSpPr>
-            <a:spLocks noGrp="1"/>
-          </p:cNvSpPr>
-          <p:nvPr>
-            <p:ph idx="1"/>
-          </p:nvPr>
-        </p:nvSpPr>
-        <p:spPr/>
-        <p:txBody>
-          <a:bodyPr/>
-          <a:lstStyle/>
-          <a:p>
-            <a:r>
-              <a:rPr lang="en-US" dirty="0" smtClean="0"/>
-              <a:t>What are the possible behaviors of the cat?</a:t>
-            </a:r>
-          </a:p>
-          <a:p>
-            <a:pPr lvl="1"/>
-            <a:r>
-              <a:rPr lang="en-US" dirty="0" smtClean="0"/>
-              <a:t>as it falls?</a:t>
-            </a:r>
-          </a:p>
-          <a:p>
-            <a:pPr lvl="1"/>
-            <a:r>
-              <a:rPr lang="en-US" dirty="0" smtClean="0"/>
-              <a:t>as it is dragged?</a:t>
-            </a:r>
-          </a:p>
-          <a:p>
-            <a:r>
-              <a:rPr lang="en-US" dirty="0"/>
-              <a:t>If we can answer these questions, we can determine what information needs to be represented for the cat</a:t>
-            </a:r>
-            <a:r>
-              <a:rPr lang="en-US" dirty="0" smtClean="0"/>
-              <a:t>.</a:t>
-            </a:r>
-          </a:p>
-          <a:p>
-            <a:r>
-              <a:rPr lang="en-US" dirty="0" smtClean="0"/>
-              <a:t>Let's write down the answers in graphical form.</a:t>
-            </a:r>
-            <a:endParaRPr lang="en-US" dirty="0"/>
-          </a:p>
-          <a:p>
-            <a:endParaRPr lang="en-US" dirty="0" smtClean="0"/>
           </a:p>
         </p:txBody>
       </p:sp>
@@ -12940,13 +12228,6 @@
   <p:clrMapOvr>
     <a:masterClrMapping/>
   </p:clrMapOvr>
-  <p:timing>
-    <p:tnLst>
-      <p:par>
-        <p:cTn id="1" dur="indefinite" restart="never" nodeType="tmRoot"/>
-      </p:par>
-    </p:tnLst>
-  </p:timing>
 </p:sld>
 </file>
 
@@ -12983,10 +12264,9 @@
           <a:lstStyle/>
           <a:p>
             <a:r>
-              <a:rPr lang="en-US" dirty="0" smtClean="0"/>
+              <a:rPr lang="en-US" dirty="0"/>
               <a:t>Life Cycle of a falling cat</a:t>
             </a:r>
-            <a:endParaRPr lang="en-US" dirty="0"/>
           </a:p>
         </p:txBody>
       </p:sp>
@@ -13013,7 +12293,7 @@
           <a:lstStyle/>
           <a:p>
             <a:r>
-              <a:rPr lang="en-US" dirty="0" smtClean="0"/>
+              <a:rPr lang="en-US" dirty="0"/>
               <a:t>any other key event</a:t>
             </a:r>
           </a:p>
@@ -13055,14 +12335,14 @@
           <a:p>
             <a:pPr algn="ctr"/>
             <a:r>
-              <a:rPr lang="en-US" sz="2800" dirty="0" err="1" smtClean="0">
+              <a:rPr lang="en-US" sz="2800" dirty="0" err="1">
                 <a:solidFill>
                   <a:schemeClr val="tx1"/>
                 </a:solidFill>
               </a:rPr>
               <a:t>unpaused</a:t>
             </a:r>
-            <a:endParaRPr lang="en-US" sz="2800" dirty="0" smtClean="0">
+            <a:endParaRPr lang="en-US" sz="2800" dirty="0">
               <a:solidFill>
                 <a:schemeClr val="tx1"/>
               </a:solidFill>
@@ -13106,7 +12386,7 @@
           <a:p>
             <a:pPr algn="ctr"/>
             <a:r>
-              <a:rPr lang="en-US" sz="2800" dirty="0" smtClean="0">
+              <a:rPr lang="en-US" sz="2800" dirty="0">
                 <a:solidFill>
                   <a:schemeClr val="tx1"/>
                 </a:solidFill>
@@ -13139,7 +12419,7 @@
           <a:lstStyle/>
           <a:p>
             <a:r>
-              <a:rPr lang="en-US" dirty="0" smtClean="0"/>
+              <a:rPr lang="en-US" dirty="0"/>
               <a:t>space bar</a:t>
             </a:r>
           </a:p>
@@ -13168,10 +12448,9 @@
           <a:lstStyle/>
           <a:p>
             <a:r>
-              <a:rPr lang="en-US" dirty="0" smtClean="0"/>
+              <a:rPr lang="en-US" dirty="0"/>
               <a:t>space bar</a:t>
             </a:r>
-            <a:endParaRPr lang="en-US" dirty="0"/>
           </a:p>
         </p:txBody>
       </p:sp>
@@ -13198,11 +12477,11 @@
           <a:lstStyle/>
           <a:p>
             <a:r>
-              <a:rPr lang="en-US" dirty="0" smtClean="0"/>
+              <a:rPr lang="en-US" dirty="0"/>
               <a:t>initially, cat is </a:t>
             </a:r>
             <a:r>
-              <a:rPr lang="en-US" dirty="0" err="1" smtClean="0"/>
+              <a:rPr lang="en-US" dirty="0" err="1"/>
               <a:t>unpaused</a:t>
             </a:r>
             <a:endParaRPr lang="en-US" dirty="0"/>
@@ -13461,7 +12740,7 @@
           <a:lstStyle/>
           <a:p>
             <a:r>
-              <a:rPr lang="en-US" dirty="0" smtClean="0"/>
+              <a:rPr lang="en-US" dirty="0"/>
               <a:t>any other key event</a:t>
             </a:r>
           </a:p>
@@ -13508,36 +12787,28 @@
           <a:lstStyle/>
           <a:p>
             <a:r>
-              <a:rPr lang="en-US" dirty="0" smtClean="0">
-                <a:solidFill>
-                  <a:schemeClr val="tx1"/>
-                </a:solidFill>
-              </a:rPr>
-              <a:t>As the cat falls, it is either paused or </a:t>
-            </a:r>
-            <a:r>
-              <a:rPr lang="en-US" dirty="0" err="1" smtClean="0">
-                <a:solidFill>
-                  <a:schemeClr val="tx1"/>
-                </a:solidFill>
-              </a:rPr>
-              <a:t>unpaused</a:t>
-            </a:r>
-            <a:r>
-              <a:rPr lang="en-US" dirty="0" smtClean="0">
-                <a:solidFill>
-                  <a:schemeClr val="tx1"/>
-                </a:solidFill>
-              </a:rPr>
-              <a:t>. </a:t>
-            </a:r>
-            <a:r>
               <a:rPr lang="en-US" dirty="0">
                 <a:solidFill>
                   <a:schemeClr val="tx1"/>
                 </a:solidFill>
               </a:rPr>
-              <a:t>When the user hits the space bar, an </a:t>
+              <a:t>As the cat falls, it is either paused or </a:t>
+            </a:r>
+            <a:r>
+              <a:rPr lang="en-US" dirty="0" err="1">
+                <a:solidFill>
+                  <a:schemeClr val="tx1"/>
+                </a:solidFill>
+              </a:rPr>
+              <a:t>unpaused</a:t>
+            </a:r>
+            <a:r>
+              <a:rPr lang="en-US" dirty="0">
+                <a:solidFill>
+                  <a:schemeClr val="tx1"/>
+                </a:solidFill>
+              </a:rPr>
+              <a:t>. When the user hits the space bar, an </a:t>
             </a:r>
             <a:r>
               <a:rPr lang="en-US" dirty="0" err="1">
@@ -13615,20 +12886,12 @@
           <a:lstStyle/>
           <a:p>
             <a:r>
-              <a:rPr lang="en-US" dirty="0" smtClean="0">
-                <a:solidFill>
-                  <a:schemeClr val="tx1"/>
-                </a:solidFill>
-              </a:rPr>
-              <a:t>This </a:t>
-            </a:r>
-            <a:r>
               <a:rPr lang="en-US" dirty="0">
                 <a:solidFill>
                   <a:schemeClr val="tx1"/>
                 </a:solidFill>
               </a:rPr>
-              <a:t>is, of course, the same analysis that we did for falling-cat, but it's helpful to see it in graphical form.</a:t>
+              <a:t>This is, of course, the same analysis that we did for falling-cat, but it's helpful to see it in graphical form.</a:t>
             </a:r>
           </a:p>
         </p:txBody>
@@ -13666,13 +12929,6 @@
   <p:clrMapOvr>
     <a:masterClrMapping/>
   </p:clrMapOvr>
-  <p:timing>
-    <p:tnLst>
-      <p:par>
-        <p:cTn id="1" dur="indefinite" restart="never" nodeType="tmRoot"/>
-      </p:par>
-    </p:tnLst>
-  </p:timing>
 </p:sld>
 </file>
 
@@ -13709,10 +12965,9 @@
           <a:lstStyle/>
           <a:p>
             <a:r>
-              <a:rPr lang="en-US" dirty="0" smtClean="0"/>
+              <a:rPr lang="en-US" dirty="0"/>
               <a:t>Life Cycle of a dragged cat</a:t>
             </a:r>
-            <a:endParaRPr lang="en-US" dirty="0"/>
           </a:p>
         </p:txBody>
       </p:sp>
@@ -13739,7 +12994,7 @@
           <a:lstStyle/>
           <a:p>
             <a:r>
-              <a:rPr lang="en-US" dirty="0" smtClean="0"/>
+              <a:rPr lang="en-US" dirty="0"/>
               <a:t>drag: cat follows mouse</a:t>
             </a:r>
           </a:p>
@@ -13781,7 +13036,7 @@
           <a:p>
             <a:pPr algn="ctr"/>
             <a:r>
-              <a:rPr lang="en-US" sz="2800" dirty="0" smtClean="0">
+              <a:rPr lang="en-US" sz="2800" dirty="0">
                 <a:solidFill>
                   <a:schemeClr val="tx1"/>
                 </a:solidFill>
@@ -13827,7 +13082,7 @@
           <a:p>
             <a:pPr algn="ctr"/>
             <a:r>
-              <a:rPr lang="en-US" sz="2800" dirty="0" smtClean="0">
+              <a:rPr lang="en-US" sz="2800" dirty="0">
                 <a:solidFill>
                   <a:schemeClr val="tx1"/>
                 </a:solidFill>
@@ -13860,7 +13115,7 @@
           <a:lstStyle/>
           <a:p>
             <a:r>
-              <a:rPr lang="en-US" dirty="0" smtClean="0"/>
+              <a:rPr lang="en-US" dirty="0"/>
               <a:t>button-down in image</a:t>
             </a:r>
           </a:p>
@@ -13889,10 +13144,9 @@
           <a:lstStyle/>
           <a:p>
             <a:r>
-              <a:rPr lang="en-US" dirty="0" smtClean="0"/>
+              <a:rPr lang="en-US" dirty="0"/>
               <a:t>button-up</a:t>
             </a:r>
-            <a:endParaRPr lang="en-US" dirty="0"/>
           </a:p>
         </p:txBody>
       </p:sp>
@@ -13919,10 +13173,9 @@
           <a:lstStyle/>
           <a:p>
             <a:r>
-              <a:rPr lang="en-US" dirty="0" smtClean="0"/>
+              <a:rPr lang="en-US" dirty="0"/>
               <a:t>initially, cat is unselected</a:t>
             </a:r>
-            <a:endParaRPr lang="en-US" dirty="0"/>
           </a:p>
         </p:txBody>
       </p:sp>
@@ -14150,7 +13403,7 @@
           <a:p>
             <a:pPr algn="ctr"/>
             <a:r>
-              <a:rPr lang="en-US" dirty="0" smtClean="0">
+              <a:rPr lang="en-US" dirty="0">
                 <a:solidFill>
                   <a:schemeClr val="tx1"/>
                 </a:solidFill>
@@ -14188,13 +13441,6 @@
   <p:clrMapOvr>
     <a:masterClrMapping/>
   </p:clrMapOvr>
-  <p:timing>
-    <p:tnLst>
-      <p:par>
-        <p:cTn id="1" dur="indefinite" restart="never" nodeType="tmRoot"/>
-      </p:par>
-    </p:tnLst>
-  </p:timing>
 </p:sld>
 </file>
 

</xml_diff>